<commit_message>
discussion slides for week 3
</commit_message>
<xml_diff>
--- a/XX_section/disc02.pptx
+++ b/XX_section/disc02.pptx
@@ -5,17 +5,15 @@
     <p:sldMasterId id="2147483648" r:id="rId1"/>
   </p:sldMasterIdLst>
   <p:notesMasterIdLst>
-    <p:notesMasterId r:id="rId10"/>
+    <p:notesMasterId r:id="rId8"/>
   </p:notesMasterIdLst>
   <p:sldIdLst>
     <p:sldId id="256" r:id="rId2"/>
     <p:sldId id="258" r:id="rId3"/>
     <p:sldId id="259" r:id="rId4"/>
-    <p:sldId id="261" r:id="rId5"/>
-    <p:sldId id="264" r:id="rId6"/>
-    <p:sldId id="265" r:id="rId7"/>
-    <p:sldId id="260" r:id="rId8"/>
-    <p:sldId id="263" r:id="rId9"/>
+    <p:sldId id="260" r:id="rId5"/>
+    <p:sldId id="261" r:id="rId6"/>
+    <p:sldId id="262" r:id="rId7"/>
   </p:sldIdLst>
   <p:sldSz cx="24384000" cy="13716000"/>
   <p:notesSz cx="6858000" cy="9144000"/>
@@ -70,13 +68,13 @@
         </a:solidFill>
         <a:effectLst/>
         <a:uFillTx/>
-        <a:latin typeface="+mn-lt"/>
-        <a:ea typeface="+mn-ea"/>
-        <a:cs typeface="+mn-cs"/>
+        <a:latin typeface="Avenir Next"/>
+        <a:ea typeface="Avenir Next"/>
+        <a:cs typeface="Avenir Next"/>
         <a:sym typeface="Avenir Next"/>
       </a:defRPr>
     </a:lvl1pPr>
-    <a:lvl2pPr marL="0" marR="0" indent="228600" algn="l" defTabSz="825500" rtl="0" fontAlgn="auto" latinLnBrk="0" hangingPunct="0">
+    <a:lvl2pPr marL="0" marR="0" indent="0" algn="l" defTabSz="825500" rtl="0" fontAlgn="auto" latinLnBrk="0" hangingPunct="0">
       <a:lnSpc>
         <a:spcPct val="100000"/>
       </a:lnSpc>
@@ -100,13 +98,13 @@
         </a:solidFill>
         <a:effectLst/>
         <a:uFillTx/>
-        <a:latin typeface="+mn-lt"/>
-        <a:ea typeface="+mn-ea"/>
-        <a:cs typeface="+mn-cs"/>
+        <a:latin typeface="Avenir Next"/>
+        <a:ea typeface="Avenir Next"/>
+        <a:cs typeface="Avenir Next"/>
         <a:sym typeface="Avenir Next"/>
       </a:defRPr>
     </a:lvl2pPr>
-    <a:lvl3pPr marL="0" marR="0" indent="457200" algn="l" defTabSz="825500" rtl="0" fontAlgn="auto" latinLnBrk="0" hangingPunct="0">
+    <a:lvl3pPr marL="0" marR="0" indent="0" algn="l" defTabSz="825500" rtl="0" fontAlgn="auto" latinLnBrk="0" hangingPunct="0">
       <a:lnSpc>
         <a:spcPct val="100000"/>
       </a:lnSpc>
@@ -130,13 +128,13 @@
         </a:solidFill>
         <a:effectLst/>
         <a:uFillTx/>
-        <a:latin typeface="+mn-lt"/>
-        <a:ea typeface="+mn-ea"/>
-        <a:cs typeface="+mn-cs"/>
+        <a:latin typeface="Avenir Next"/>
+        <a:ea typeface="Avenir Next"/>
+        <a:cs typeface="Avenir Next"/>
         <a:sym typeface="Avenir Next"/>
       </a:defRPr>
     </a:lvl3pPr>
-    <a:lvl4pPr marL="0" marR="0" indent="685800" algn="l" defTabSz="825500" rtl="0" fontAlgn="auto" latinLnBrk="0" hangingPunct="0">
+    <a:lvl4pPr marL="0" marR="0" indent="0" algn="l" defTabSz="825500" rtl="0" fontAlgn="auto" latinLnBrk="0" hangingPunct="0">
       <a:lnSpc>
         <a:spcPct val="100000"/>
       </a:lnSpc>
@@ -160,13 +158,13 @@
         </a:solidFill>
         <a:effectLst/>
         <a:uFillTx/>
-        <a:latin typeface="+mn-lt"/>
-        <a:ea typeface="+mn-ea"/>
-        <a:cs typeface="+mn-cs"/>
+        <a:latin typeface="Avenir Next"/>
+        <a:ea typeface="Avenir Next"/>
+        <a:cs typeface="Avenir Next"/>
         <a:sym typeface="Avenir Next"/>
       </a:defRPr>
     </a:lvl4pPr>
-    <a:lvl5pPr marL="0" marR="0" indent="914400" algn="l" defTabSz="825500" rtl="0" fontAlgn="auto" latinLnBrk="0" hangingPunct="0">
+    <a:lvl5pPr marL="0" marR="0" indent="0" algn="l" defTabSz="825500" rtl="0" fontAlgn="auto" latinLnBrk="0" hangingPunct="0">
       <a:lnSpc>
         <a:spcPct val="100000"/>
       </a:lnSpc>
@@ -190,13 +188,13 @@
         </a:solidFill>
         <a:effectLst/>
         <a:uFillTx/>
-        <a:latin typeface="+mn-lt"/>
-        <a:ea typeface="+mn-ea"/>
-        <a:cs typeface="+mn-cs"/>
+        <a:latin typeface="Avenir Next"/>
+        <a:ea typeface="Avenir Next"/>
+        <a:cs typeface="Avenir Next"/>
         <a:sym typeface="Avenir Next"/>
       </a:defRPr>
     </a:lvl5pPr>
-    <a:lvl6pPr marL="0" marR="0" indent="1143000" algn="l" defTabSz="825500" rtl="0" fontAlgn="auto" latinLnBrk="0" hangingPunct="0">
+    <a:lvl6pPr marL="0" marR="0" indent="0" algn="l" defTabSz="825500" rtl="0" fontAlgn="auto" latinLnBrk="0" hangingPunct="0">
       <a:lnSpc>
         <a:spcPct val="100000"/>
       </a:lnSpc>
@@ -220,13 +218,13 @@
         </a:solidFill>
         <a:effectLst/>
         <a:uFillTx/>
-        <a:latin typeface="+mn-lt"/>
-        <a:ea typeface="+mn-ea"/>
-        <a:cs typeface="+mn-cs"/>
+        <a:latin typeface="Avenir Next"/>
+        <a:ea typeface="Avenir Next"/>
+        <a:cs typeface="Avenir Next"/>
         <a:sym typeface="Avenir Next"/>
       </a:defRPr>
     </a:lvl6pPr>
-    <a:lvl7pPr marL="0" marR="0" indent="1371600" algn="l" defTabSz="825500" rtl="0" fontAlgn="auto" latinLnBrk="0" hangingPunct="0">
+    <a:lvl7pPr marL="0" marR="0" indent="0" algn="l" defTabSz="825500" rtl="0" fontAlgn="auto" latinLnBrk="0" hangingPunct="0">
       <a:lnSpc>
         <a:spcPct val="100000"/>
       </a:lnSpc>
@@ -250,13 +248,13 @@
         </a:solidFill>
         <a:effectLst/>
         <a:uFillTx/>
-        <a:latin typeface="+mn-lt"/>
-        <a:ea typeface="+mn-ea"/>
-        <a:cs typeface="+mn-cs"/>
+        <a:latin typeface="Avenir Next"/>
+        <a:ea typeface="Avenir Next"/>
+        <a:cs typeface="Avenir Next"/>
         <a:sym typeface="Avenir Next"/>
       </a:defRPr>
     </a:lvl7pPr>
-    <a:lvl8pPr marL="0" marR="0" indent="1600200" algn="l" defTabSz="825500" rtl="0" fontAlgn="auto" latinLnBrk="0" hangingPunct="0">
+    <a:lvl8pPr marL="0" marR="0" indent="0" algn="l" defTabSz="825500" rtl="0" fontAlgn="auto" latinLnBrk="0" hangingPunct="0">
       <a:lnSpc>
         <a:spcPct val="100000"/>
       </a:lnSpc>
@@ -280,13 +278,13 @@
         </a:solidFill>
         <a:effectLst/>
         <a:uFillTx/>
-        <a:latin typeface="+mn-lt"/>
-        <a:ea typeface="+mn-ea"/>
-        <a:cs typeface="+mn-cs"/>
+        <a:latin typeface="Avenir Next"/>
+        <a:ea typeface="Avenir Next"/>
+        <a:cs typeface="Avenir Next"/>
         <a:sym typeface="Avenir Next"/>
       </a:defRPr>
     </a:lvl8pPr>
-    <a:lvl9pPr marL="0" marR="0" indent="1828800" algn="l" defTabSz="825500" rtl="0" fontAlgn="auto" latinLnBrk="0" hangingPunct="0">
+    <a:lvl9pPr marL="0" marR="0" indent="0" algn="l" defTabSz="825500" rtl="0" fontAlgn="auto" latinLnBrk="0" hangingPunct="0">
       <a:lnSpc>
         <a:spcPct val="100000"/>
       </a:lnSpc>
@@ -310,9 +308,9 @@
         </a:solidFill>
         <a:effectLst/>
         <a:uFillTx/>
-        <a:latin typeface="+mn-lt"/>
-        <a:ea typeface="+mn-ea"/>
-        <a:cs typeface="+mn-cs"/>
+        <a:latin typeface="Avenir Next"/>
+        <a:ea typeface="Avenir Next"/>
+        <a:cs typeface="Avenir Next"/>
         <a:sym typeface="Avenir Next"/>
       </a:defRPr>
     </a:lvl9pPr>
@@ -405,9 +403,9 @@
         <a:spcPct val="117999"/>
       </a:lnSpc>
       <a:defRPr sz="2200">
-        <a:latin typeface="Helvetica Neue"/>
-        <a:ea typeface="Helvetica Neue"/>
-        <a:cs typeface="Helvetica Neue"/>
+        <a:latin typeface="+mj-lt"/>
+        <a:ea typeface="+mj-ea"/>
+        <a:cs typeface="+mj-cs"/>
         <a:sym typeface="Helvetica Neue"/>
       </a:defRPr>
     </a:lvl1pPr>
@@ -416,9 +414,9 @@
         <a:spcPct val="117999"/>
       </a:lnSpc>
       <a:defRPr sz="2200">
-        <a:latin typeface="Helvetica Neue"/>
-        <a:ea typeface="Helvetica Neue"/>
-        <a:cs typeface="Helvetica Neue"/>
+        <a:latin typeface="+mj-lt"/>
+        <a:ea typeface="+mj-ea"/>
+        <a:cs typeface="+mj-cs"/>
         <a:sym typeface="Helvetica Neue"/>
       </a:defRPr>
     </a:lvl2pPr>
@@ -427,9 +425,9 @@
         <a:spcPct val="117999"/>
       </a:lnSpc>
       <a:defRPr sz="2200">
-        <a:latin typeface="Helvetica Neue"/>
-        <a:ea typeface="Helvetica Neue"/>
-        <a:cs typeface="Helvetica Neue"/>
+        <a:latin typeface="+mj-lt"/>
+        <a:ea typeface="+mj-ea"/>
+        <a:cs typeface="+mj-cs"/>
         <a:sym typeface="Helvetica Neue"/>
       </a:defRPr>
     </a:lvl3pPr>
@@ -438,9 +436,9 @@
         <a:spcPct val="117999"/>
       </a:lnSpc>
       <a:defRPr sz="2200">
-        <a:latin typeface="Helvetica Neue"/>
-        <a:ea typeface="Helvetica Neue"/>
-        <a:cs typeface="Helvetica Neue"/>
+        <a:latin typeface="+mj-lt"/>
+        <a:ea typeface="+mj-ea"/>
+        <a:cs typeface="+mj-cs"/>
         <a:sym typeface="Helvetica Neue"/>
       </a:defRPr>
     </a:lvl4pPr>
@@ -449,9 +447,9 @@
         <a:spcPct val="117999"/>
       </a:lnSpc>
       <a:defRPr sz="2200">
-        <a:latin typeface="Helvetica Neue"/>
-        <a:ea typeface="Helvetica Neue"/>
-        <a:cs typeface="Helvetica Neue"/>
+        <a:latin typeface="+mj-lt"/>
+        <a:ea typeface="+mj-ea"/>
+        <a:cs typeface="+mj-cs"/>
         <a:sym typeface="Helvetica Neue"/>
       </a:defRPr>
     </a:lvl5pPr>
@@ -460,9 +458,9 @@
         <a:spcPct val="117999"/>
       </a:lnSpc>
       <a:defRPr sz="2200">
-        <a:latin typeface="Helvetica Neue"/>
-        <a:ea typeface="Helvetica Neue"/>
-        <a:cs typeface="Helvetica Neue"/>
+        <a:latin typeface="+mj-lt"/>
+        <a:ea typeface="+mj-ea"/>
+        <a:cs typeface="+mj-cs"/>
         <a:sym typeface="Helvetica Neue"/>
       </a:defRPr>
     </a:lvl6pPr>
@@ -471,9 +469,9 @@
         <a:spcPct val="117999"/>
       </a:lnSpc>
       <a:defRPr sz="2200">
-        <a:latin typeface="Helvetica Neue"/>
-        <a:ea typeface="Helvetica Neue"/>
-        <a:cs typeface="Helvetica Neue"/>
+        <a:latin typeface="+mj-lt"/>
+        <a:ea typeface="+mj-ea"/>
+        <a:cs typeface="+mj-cs"/>
         <a:sym typeface="Helvetica Neue"/>
       </a:defRPr>
     </a:lvl7pPr>
@@ -482,9 +480,9 @@
         <a:spcPct val="117999"/>
       </a:lnSpc>
       <a:defRPr sz="2200">
-        <a:latin typeface="Helvetica Neue"/>
-        <a:ea typeface="Helvetica Neue"/>
-        <a:cs typeface="Helvetica Neue"/>
+        <a:latin typeface="+mj-lt"/>
+        <a:ea typeface="+mj-ea"/>
+        <a:cs typeface="+mj-cs"/>
         <a:sym typeface="Helvetica Neue"/>
       </a:defRPr>
     </a:lvl8pPr>
@@ -493,9 +491,9 @@
         <a:spcPct val="117999"/>
       </a:lnSpc>
       <a:defRPr sz="2200">
-        <a:latin typeface="Helvetica Neue"/>
-        <a:ea typeface="Helvetica Neue"/>
-        <a:cs typeface="Helvetica Neue"/>
+        <a:latin typeface="+mj-lt"/>
+        <a:ea typeface="+mj-ea"/>
+        <a:cs typeface="+mj-cs"/>
         <a:sym typeface="Helvetica Neue"/>
       </a:defRPr>
     </a:lvl9pPr>
@@ -541,9 +539,7 @@
         </p:spPr>
         <p:txBody>
           <a:bodyPr anchor="b"/>
-          <a:lstStyle>
-            <a:lvl1pPr algn="l"/>
-          </a:lstStyle>
+          <a:lstStyle/>
           <a:p>
             <a:r>
               <a:t>Title Text</a:t>
@@ -564,7 +560,7 @@
         <p:spPr>
           <a:xfrm>
             <a:off x="1778000" y="7073900"/>
-            <a:ext cx="20828000" cy="5522276"/>
+            <a:ext cx="20828000" cy="5522277"/>
           </a:xfrm>
           <a:prstGeom prst="rect">
             <a:avLst/>
@@ -579,7 +575,6 @@
               </a:spcBef>
               <a:buSzTx/>
               <a:buNone/>
-              <a:defRPr sz="5400"/>
             </a:lvl1pPr>
             <a:lvl2pPr marL="0" indent="0">
               <a:spcBef>
@@ -587,7 +582,6 @@
               </a:spcBef>
               <a:buSzTx/>
               <a:buNone/>
-              <a:defRPr sz="5400"/>
             </a:lvl2pPr>
             <a:lvl3pPr marL="0" indent="0">
               <a:spcBef>
@@ -595,7 +589,6 @@
               </a:spcBef>
               <a:buSzTx/>
               <a:buNone/>
-              <a:defRPr sz="5400"/>
             </a:lvl3pPr>
             <a:lvl4pPr marL="0" indent="0">
               <a:spcBef>
@@ -603,7 +596,6 @@
               </a:spcBef>
               <a:buSzTx/>
               <a:buNone/>
-              <a:defRPr sz="5400"/>
             </a:lvl4pPr>
             <a:lvl5pPr marL="0" indent="0">
               <a:spcBef>
@@ -611,7 +603,6 @@
               </a:spcBef>
               <a:buSzTx/>
               <a:buNone/>
-              <a:defRPr sz="5400"/>
             </a:lvl5pPr>
           </a:lstStyle>
           <a:p>
@@ -710,7 +701,7 @@
         <p:spPr>
           <a:xfrm>
             <a:off x="0" y="0"/>
-            <a:ext cx="24384000" cy="16264467"/>
+            <a:ext cx="24384000" cy="16264468"/>
           </a:xfrm>
           <a:prstGeom prst="rect">
             <a:avLst/>
@@ -843,7 +834,7 @@
         <p:spPr>
           <a:xfrm>
             <a:off x="3124200" y="-38100"/>
-            <a:ext cx="18135600" cy="12096698"/>
+            <a:ext cx="18135600" cy="12096699"/>
           </a:xfrm>
           <a:prstGeom prst="rect">
             <a:avLst/>
@@ -880,7 +871,9 @@
         </p:spPr>
         <p:txBody>
           <a:bodyPr anchor="b"/>
-          <a:lstStyle/>
+          <a:lstStyle>
+            <a:lvl1pPr algn="ctr"/>
+          </a:lstStyle>
           <a:p>
             <a:r>
               <a:t>Title Text</a:t>
@@ -916,7 +909,6 @@
               </a:spcBef>
               <a:buSzTx/>
               <a:buNone/>
-              <a:defRPr sz="5400"/>
             </a:lvl1pPr>
             <a:lvl2pPr marL="0" indent="0" algn="ctr">
               <a:spcBef>
@@ -924,7 +916,6 @@
               </a:spcBef>
               <a:buSzTx/>
               <a:buNone/>
-              <a:defRPr sz="5400"/>
             </a:lvl2pPr>
             <a:lvl3pPr marL="0" indent="0" algn="ctr">
               <a:spcBef>
@@ -932,7 +923,6 @@
               </a:spcBef>
               <a:buSzTx/>
               <a:buNone/>
-              <a:defRPr sz="5400"/>
             </a:lvl3pPr>
             <a:lvl4pPr marL="0" indent="0" algn="ctr">
               <a:spcBef>
@@ -940,7 +930,6 @@
               </a:spcBef>
               <a:buSzTx/>
               <a:buNone/>
-              <a:defRPr sz="5400"/>
             </a:lvl4pPr>
             <a:lvl5pPr marL="0" indent="0" algn="ctr">
               <a:spcBef>
@@ -948,7 +937,6 @@
               </a:spcBef>
               <a:buSzTx/>
               <a:buNone/>
-              <a:defRPr sz="5400"/>
             </a:lvl5pPr>
           </a:lstStyle>
           <a:p>
@@ -1055,7 +1043,9 @@
         </p:spPr>
         <p:txBody>
           <a:bodyPr/>
-          <a:lstStyle/>
+          <a:lstStyle>
+            <a:lvl1pPr algn="ctr"/>
+          </a:lstStyle>
           <a:p>
             <a:r>
               <a:t>Title Text</a:t>
@@ -1166,7 +1156,7 @@
         <p:txBody>
           <a:bodyPr anchor="b"/>
           <a:lstStyle>
-            <a:lvl1pPr>
+            <a:lvl1pPr algn="ctr">
               <a:defRPr sz="8400"/>
             </a:lvl1pPr>
           </a:lstStyle>
@@ -1205,7 +1195,6 @@
               </a:spcBef>
               <a:buSzTx/>
               <a:buNone/>
-              <a:defRPr sz="5400"/>
             </a:lvl1pPr>
             <a:lvl2pPr marL="0" indent="0" algn="ctr">
               <a:spcBef>
@@ -1213,7 +1202,6 @@
               </a:spcBef>
               <a:buSzTx/>
               <a:buNone/>
-              <a:defRPr sz="5400"/>
             </a:lvl2pPr>
             <a:lvl3pPr marL="0" indent="0" algn="ctr">
               <a:spcBef>
@@ -1221,7 +1209,6 @@
               </a:spcBef>
               <a:buSzTx/>
               <a:buNone/>
-              <a:defRPr sz="5400"/>
             </a:lvl3pPr>
             <a:lvl4pPr marL="0" indent="0" algn="ctr">
               <a:spcBef>
@@ -1229,7 +1216,6 @@
               </a:spcBef>
               <a:buSzTx/>
               <a:buNone/>
-              <a:defRPr sz="5400"/>
             </a:lvl4pPr>
             <a:lvl5pPr marL="0" indent="0" algn="ctr">
               <a:spcBef>
@@ -1237,7 +1223,6 @@
               </a:spcBef>
               <a:buSzTx/>
               <a:buNone/>
-              <a:defRPr sz="5400"/>
             </a:lvl5pPr>
           </a:lstStyle>
           <a:p>
@@ -1340,9 +1325,7 @@
         </p:spPr>
         <p:txBody>
           <a:bodyPr/>
-          <a:lstStyle>
-            <a:lvl1pPr algn="l"/>
-          </a:lstStyle>
+          <a:lstStyle/>
           <a:p>
             <a:r>
               <a:t>Title Text</a:t>
@@ -1367,23 +1350,7 @@
         </p:spPr>
         <p:txBody>
           <a:bodyPr/>
-          <a:lstStyle>
-            <a:lvl1pPr marL="714374" indent="-714374">
-              <a:defRPr sz="5400"/>
-            </a:lvl1pPr>
-            <a:lvl2pPr marL="1425575" indent="-714375">
-              <a:defRPr sz="5400"/>
-            </a:lvl2pPr>
-            <a:lvl3pPr marL="2136775" indent="-714375">
-              <a:defRPr sz="5400"/>
-            </a:lvl3pPr>
-            <a:lvl4pPr marL="2847975" indent="-714375">
-              <a:defRPr sz="5400"/>
-            </a:lvl4pPr>
-            <a:lvl5pPr marL="3559175" indent="-714375">
-              <a:defRPr sz="5400"/>
-            </a:lvl5pPr>
-          </a:lstStyle>
+          <a:lstStyle/>
           <a:p>
             <a:r>
               <a:t>Body Level One</a:t>
@@ -1513,7 +1480,9 @@
         </p:spPr>
         <p:txBody>
           <a:bodyPr/>
-          <a:lstStyle/>
+          <a:lstStyle>
+            <a:lvl1pPr algn="ctr"/>
+          </a:lstStyle>
           <a:p>
             <a:r>
               <a:t>Title Text</a:t>
@@ -1678,23 +1647,7 @@
         </p:spPr>
         <p:txBody>
           <a:bodyPr/>
-          <a:lstStyle>
-            <a:lvl1pPr marL="714374" indent="-714374">
-              <a:defRPr sz="5400"/>
-            </a:lvl1pPr>
-            <a:lvl2pPr marL="1425575" indent="-714375">
-              <a:defRPr sz="5400"/>
-            </a:lvl2pPr>
-            <a:lvl3pPr marL="2136775" indent="-714375">
-              <a:defRPr sz="5400"/>
-            </a:lvl3pPr>
-            <a:lvl4pPr marL="2847975" indent="-714375">
-              <a:defRPr sz="5400"/>
-            </a:lvl4pPr>
-            <a:lvl5pPr marL="3559175" indent="-714375">
-              <a:defRPr sz="5400"/>
-            </a:lvl5pPr>
-          </a:lstStyle>
+          <a:lstStyle/>
           <a:p>
             <a:r>
               <a:t>Body Level One</a:t>
@@ -1791,7 +1744,7 @@
         <p:spPr>
           <a:xfrm>
             <a:off x="15681340" y="7035800"/>
-            <a:ext cx="8396678" cy="5600700"/>
+            <a:ext cx="8396679" cy="5600700"/>
           </a:xfrm>
           <a:prstGeom prst="rect">
             <a:avLst/>
@@ -1919,12 +1872,12 @@
       </p:grpSpPr>
       <p:sp>
         <p:nvSpPr>
-          <p:cNvPr id="93" name="–Johnny Appleseed"/>
+          <p:cNvPr id="93" name="Body Level One…"/>
           <p:cNvSpPr txBox="1">
             <a:spLocks noGrp="1"/>
           </p:cNvSpPr>
           <p:nvPr>
-            <p:ph type="body" sz="quarter" idx="13"/>
+            <p:ph type="body" sz="quarter" idx="1"/>
           </p:nvPr>
         </p:nvSpPr>
         <p:spPr>
@@ -1937,9 +1890,7 @@
           </a:prstGeom>
         </p:spPr>
         <p:txBody>
-          <a:bodyPr anchor="t">
-            <a:spAutoFit/>
-          </a:bodyPr>
+          <a:bodyPr anchor="t"/>
           <a:lstStyle>
             <a:lvl1pPr marL="0" indent="0" algn="ctr">
               <a:spcBef>
@@ -1949,10 +1900,58 @@
               <a:buNone/>
               <a:defRPr sz="3200" i="1"/>
             </a:lvl1pPr>
+            <a:lvl2pPr marL="1025769" indent="-390769" algn="ctr">
+              <a:spcBef>
+                <a:spcPts val="0"/>
+              </a:spcBef>
+              <a:defRPr sz="3200" i="1"/>
+            </a:lvl2pPr>
+            <a:lvl3pPr marL="1660769" indent="-390769" algn="ctr">
+              <a:spcBef>
+                <a:spcPts val="0"/>
+              </a:spcBef>
+              <a:defRPr sz="3200" i="1"/>
+            </a:lvl3pPr>
+            <a:lvl4pPr marL="2295769" indent="-390769" algn="ctr">
+              <a:spcBef>
+                <a:spcPts val="0"/>
+              </a:spcBef>
+              <a:defRPr sz="3200" i="1"/>
+            </a:lvl4pPr>
+            <a:lvl5pPr marL="2930769" indent="-390769" algn="ctr">
+              <a:spcBef>
+                <a:spcPts val="0"/>
+              </a:spcBef>
+              <a:defRPr sz="3200" i="1"/>
+            </a:lvl5pPr>
           </a:lstStyle>
           <a:p>
             <a:r>
-              <a:t>–Johnny Appleseed</a:t>
+              <a:t>Body Level One</a:t>
+            </a:r>
+          </a:p>
+          <a:p>
+            <a:pPr lvl="1"/>
+            <a:r>
+              <a:t>Body Level Two</a:t>
+            </a:r>
+          </a:p>
+          <a:p>
+            <a:pPr lvl="2"/>
+            <a:r>
+              <a:t>Body Level Three</a:t>
+            </a:r>
+          </a:p>
+          <a:p>
+            <a:pPr lvl="3"/>
+            <a:r>
+              <a:t>Body Level Four</a:t>
+            </a:r>
+          </a:p>
+          <a:p>
+            <a:pPr lvl="4"/>
+            <a:r>
+              <a:t>Body Level Five</a:t>
             </a:r>
           </a:p>
         </p:txBody>
@@ -1964,36 +1963,31 @@
             <a:spLocks noGrp="1"/>
           </p:cNvSpPr>
           <p:nvPr>
-            <p:ph type="body" sz="quarter" idx="14"/>
+            <p:ph type="body" sz="quarter" idx="13"/>
           </p:nvPr>
         </p:nvSpPr>
         <p:spPr>
           <a:xfrm>
-            <a:off x="2387600" y="6019799"/>
-            <a:ext cx="19621500" cy="939801"/>
+            <a:off x="2387600" y="6019798"/>
+            <a:ext cx="19621500" cy="939802"/>
           </a:xfrm>
           <a:prstGeom prst="rect">
             <a:avLst/>
           </a:prstGeom>
         </p:spPr>
         <p:txBody>
-          <a:bodyPr>
-            <a:spAutoFit/>
-          </a:bodyPr>
-          <a:lstStyle>
-            <a:lvl1pPr marL="0" indent="0" algn="ctr">
+          <a:bodyPr/>
+          <a:lstStyle/>
+          <a:p>
+            <a:pPr marL="0" indent="0" algn="ctr">
               <a:spcBef>
                 <a:spcPts val="0"/>
               </a:spcBef>
               <a:buSzTx/>
               <a:buNone/>
               <a:defRPr sz="4800"/>
-            </a:lvl1pPr>
-          </a:lstStyle>
-          <a:p>
-            <a:r>
-              <a:t>“Type a quote here.” </a:t>
-            </a:r>
+            </a:pPr>
+            <a:endParaRPr/>
           </a:p>
         </p:txBody>
       </p:sp>
@@ -2172,7 +2166,7 @@
         <p:spPr>
           <a:xfrm>
             <a:off x="11959031" y="13081000"/>
-            <a:ext cx="453238" cy="461059"/>
+            <a:ext cx="453239" cy="461059"/>
           </a:xfrm>
           <a:prstGeom prst="rect">
             <a:avLst/>
@@ -2225,7 +2219,7 @@
   <p:transition spd="med"/>
   <p:txStyles>
     <p:titleStyle>
-      <a:lvl1pPr marL="0" marR="0" indent="0" algn="ctr" defTabSz="825500" rtl="0" latinLnBrk="0">
+      <a:lvl1pPr marL="0" marR="0" indent="0" algn="l" defTabSz="825500" rtl="0" latinLnBrk="0">
         <a:lnSpc>
           <a:spcPct val="100000"/>
         </a:lnSpc>
@@ -2245,13 +2239,13 @@
             <a:srgbClr val="000000"/>
           </a:solidFill>
           <a:uFillTx/>
-          <a:latin typeface="+mn-lt"/>
-          <a:ea typeface="+mn-ea"/>
-          <a:cs typeface="+mn-cs"/>
+          <a:latin typeface="Avenir Next"/>
+          <a:ea typeface="Avenir Next"/>
+          <a:cs typeface="Avenir Next"/>
           <a:sym typeface="Avenir Next"/>
         </a:defRPr>
       </a:lvl1pPr>
-      <a:lvl2pPr marL="0" marR="0" indent="0" algn="ctr" defTabSz="825500" rtl="0" latinLnBrk="0">
+      <a:lvl2pPr marL="0" marR="0" indent="0" algn="l" defTabSz="825500" rtl="0" latinLnBrk="0">
         <a:lnSpc>
           <a:spcPct val="100000"/>
         </a:lnSpc>
@@ -2271,13 +2265,13 @@
             <a:srgbClr val="000000"/>
           </a:solidFill>
           <a:uFillTx/>
-          <a:latin typeface="+mn-lt"/>
-          <a:ea typeface="+mn-ea"/>
-          <a:cs typeface="+mn-cs"/>
+          <a:latin typeface="Avenir Next"/>
+          <a:ea typeface="Avenir Next"/>
+          <a:cs typeface="Avenir Next"/>
           <a:sym typeface="Avenir Next"/>
         </a:defRPr>
       </a:lvl2pPr>
-      <a:lvl3pPr marL="0" marR="0" indent="0" algn="ctr" defTabSz="825500" rtl="0" latinLnBrk="0">
+      <a:lvl3pPr marL="0" marR="0" indent="0" algn="l" defTabSz="825500" rtl="0" latinLnBrk="0">
         <a:lnSpc>
           <a:spcPct val="100000"/>
         </a:lnSpc>
@@ -2297,13 +2291,13 @@
             <a:srgbClr val="000000"/>
           </a:solidFill>
           <a:uFillTx/>
-          <a:latin typeface="+mn-lt"/>
-          <a:ea typeface="+mn-ea"/>
-          <a:cs typeface="+mn-cs"/>
+          <a:latin typeface="Avenir Next"/>
+          <a:ea typeface="Avenir Next"/>
+          <a:cs typeface="Avenir Next"/>
           <a:sym typeface="Avenir Next"/>
         </a:defRPr>
       </a:lvl3pPr>
-      <a:lvl4pPr marL="0" marR="0" indent="0" algn="ctr" defTabSz="825500" rtl="0" latinLnBrk="0">
+      <a:lvl4pPr marL="0" marR="0" indent="0" algn="l" defTabSz="825500" rtl="0" latinLnBrk="0">
         <a:lnSpc>
           <a:spcPct val="100000"/>
         </a:lnSpc>
@@ -2323,13 +2317,13 @@
             <a:srgbClr val="000000"/>
           </a:solidFill>
           <a:uFillTx/>
-          <a:latin typeface="+mn-lt"/>
-          <a:ea typeface="+mn-ea"/>
-          <a:cs typeface="+mn-cs"/>
+          <a:latin typeface="Avenir Next"/>
+          <a:ea typeface="Avenir Next"/>
+          <a:cs typeface="Avenir Next"/>
           <a:sym typeface="Avenir Next"/>
         </a:defRPr>
       </a:lvl4pPr>
-      <a:lvl5pPr marL="0" marR="0" indent="0" algn="ctr" defTabSz="825500" rtl="0" latinLnBrk="0">
+      <a:lvl5pPr marL="0" marR="0" indent="0" algn="l" defTabSz="825500" rtl="0" latinLnBrk="0">
         <a:lnSpc>
           <a:spcPct val="100000"/>
         </a:lnSpc>
@@ -2349,13 +2343,13 @@
             <a:srgbClr val="000000"/>
           </a:solidFill>
           <a:uFillTx/>
-          <a:latin typeface="+mn-lt"/>
-          <a:ea typeface="+mn-ea"/>
-          <a:cs typeface="+mn-cs"/>
+          <a:latin typeface="Avenir Next"/>
+          <a:ea typeface="Avenir Next"/>
+          <a:cs typeface="Avenir Next"/>
           <a:sym typeface="Avenir Next"/>
         </a:defRPr>
       </a:lvl5pPr>
-      <a:lvl6pPr marL="0" marR="0" indent="0" algn="ctr" defTabSz="825500" rtl="0" latinLnBrk="0">
+      <a:lvl6pPr marL="0" marR="0" indent="0" algn="l" defTabSz="825500" rtl="0" latinLnBrk="0">
         <a:lnSpc>
           <a:spcPct val="100000"/>
         </a:lnSpc>
@@ -2375,13 +2369,13 @@
             <a:srgbClr val="000000"/>
           </a:solidFill>
           <a:uFillTx/>
-          <a:latin typeface="+mn-lt"/>
-          <a:ea typeface="+mn-ea"/>
-          <a:cs typeface="+mn-cs"/>
+          <a:latin typeface="Avenir Next"/>
+          <a:ea typeface="Avenir Next"/>
+          <a:cs typeface="Avenir Next"/>
           <a:sym typeface="Avenir Next"/>
         </a:defRPr>
       </a:lvl6pPr>
-      <a:lvl7pPr marL="0" marR="0" indent="0" algn="ctr" defTabSz="825500" rtl="0" latinLnBrk="0">
+      <a:lvl7pPr marL="0" marR="0" indent="0" algn="l" defTabSz="825500" rtl="0" latinLnBrk="0">
         <a:lnSpc>
           <a:spcPct val="100000"/>
         </a:lnSpc>
@@ -2401,13 +2395,13 @@
             <a:srgbClr val="000000"/>
           </a:solidFill>
           <a:uFillTx/>
-          <a:latin typeface="+mn-lt"/>
-          <a:ea typeface="+mn-ea"/>
-          <a:cs typeface="+mn-cs"/>
+          <a:latin typeface="Avenir Next"/>
+          <a:ea typeface="Avenir Next"/>
+          <a:cs typeface="Avenir Next"/>
           <a:sym typeface="Avenir Next"/>
         </a:defRPr>
       </a:lvl7pPr>
-      <a:lvl8pPr marL="0" marR="0" indent="0" algn="ctr" defTabSz="825500" rtl="0" latinLnBrk="0">
+      <a:lvl8pPr marL="0" marR="0" indent="0" algn="l" defTabSz="825500" rtl="0" latinLnBrk="0">
         <a:lnSpc>
           <a:spcPct val="100000"/>
         </a:lnSpc>
@@ -2427,13 +2421,13 @@
             <a:srgbClr val="000000"/>
           </a:solidFill>
           <a:uFillTx/>
-          <a:latin typeface="+mn-lt"/>
-          <a:ea typeface="+mn-ea"/>
-          <a:cs typeface="+mn-cs"/>
+          <a:latin typeface="Avenir Next"/>
+          <a:ea typeface="Avenir Next"/>
+          <a:cs typeface="Avenir Next"/>
           <a:sym typeface="Avenir Next"/>
         </a:defRPr>
       </a:lvl8pPr>
-      <a:lvl9pPr marL="0" marR="0" indent="0" algn="ctr" defTabSz="825500" rtl="0" latinLnBrk="0">
+      <a:lvl9pPr marL="0" marR="0" indent="0" algn="l" defTabSz="825500" rtl="0" latinLnBrk="0">
         <a:lnSpc>
           <a:spcPct val="100000"/>
         </a:lnSpc>
@@ -2453,15 +2447,15 @@
             <a:srgbClr val="000000"/>
           </a:solidFill>
           <a:uFillTx/>
-          <a:latin typeface="+mn-lt"/>
-          <a:ea typeface="+mn-ea"/>
-          <a:cs typeface="+mn-cs"/>
+          <a:latin typeface="Avenir Next"/>
+          <a:ea typeface="Avenir Next"/>
+          <a:cs typeface="Avenir Next"/>
           <a:sym typeface="Avenir Next"/>
         </a:defRPr>
       </a:lvl9pPr>
     </p:titleStyle>
     <p:bodyStyle>
-      <a:lvl1pPr marL="635000" marR="0" indent="-635000" algn="l" defTabSz="825500" latinLnBrk="0">
+      <a:lvl1pPr marL="714373" marR="0" indent="-714373" algn="l" defTabSz="825500" rtl="0" latinLnBrk="0">
         <a:lnSpc>
           <a:spcPct val="100000"/>
         </a:lnSpc>
@@ -2476,18 +2470,18 @@
         <a:buFontTx/>
         <a:buChar char="•"/>
         <a:tabLst/>
-        <a:defRPr sz="5200" b="1" i="0" u="none" strike="noStrike" cap="none" spc="0" baseline="0">
+        <a:defRPr sz="5400" b="1" i="0" u="none" strike="noStrike" cap="none" spc="0" baseline="0">
           <a:solidFill>
             <a:srgbClr val="000000"/>
           </a:solidFill>
           <a:uFillTx/>
-          <a:latin typeface="+mn-lt"/>
-          <a:ea typeface="+mn-ea"/>
-          <a:cs typeface="+mn-cs"/>
+          <a:latin typeface="Avenir Next"/>
+          <a:ea typeface="Avenir Next"/>
+          <a:cs typeface="Avenir Next"/>
           <a:sym typeface="Avenir Next"/>
         </a:defRPr>
       </a:lvl1pPr>
-      <a:lvl2pPr marL="1270000" marR="0" indent="-635000" algn="l" defTabSz="825500" latinLnBrk="0">
+      <a:lvl2pPr marL="1425575" marR="0" indent="-714375" algn="l" defTabSz="825500" rtl="0" latinLnBrk="0">
         <a:lnSpc>
           <a:spcPct val="100000"/>
         </a:lnSpc>
@@ -2502,18 +2496,18 @@
         <a:buFontTx/>
         <a:buChar char="•"/>
         <a:tabLst/>
-        <a:defRPr sz="5200" b="1" i="0" u="none" strike="noStrike" cap="none" spc="0" baseline="0">
+        <a:defRPr sz="5400" b="1" i="0" u="none" strike="noStrike" cap="none" spc="0" baseline="0">
           <a:solidFill>
             <a:srgbClr val="000000"/>
           </a:solidFill>
           <a:uFillTx/>
-          <a:latin typeface="+mn-lt"/>
-          <a:ea typeface="+mn-ea"/>
-          <a:cs typeface="+mn-cs"/>
+          <a:latin typeface="Avenir Next"/>
+          <a:ea typeface="Avenir Next"/>
+          <a:cs typeface="Avenir Next"/>
           <a:sym typeface="Avenir Next"/>
         </a:defRPr>
       </a:lvl2pPr>
-      <a:lvl3pPr marL="1905000" marR="0" indent="-635000" algn="l" defTabSz="825500" latinLnBrk="0">
+      <a:lvl3pPr marL="2136775" marR="0" indent="-714375" algn="l" defTabSz="825500" rtl="0" latinLnBrk="0">
         <a:lnSpc>
           <a:spcPct val="100000"/>
         </a:lnSpc>
@@ -2528,18 +2522,18 @@
         <a:buFontTx/>
         <a:buChar char="•"/>
         <a:tabLst/>
-        <a:defRPr sz="5200" b="1" i="0" u="none" strike="noStrike" cap="none" spc="0" baseline="0">
+        <a:defRPr sz="5400" b="1" i="0" u="none" strike="noStrike" cap="none" spc="0" baseline="0">
           <a:solidFill>
             <a:srgbClr val="000000"/>
           </a:solidFill>
           <a:uFillTx/>
-          <a:latin typeface="+mn-lt"/>
-          <a:ea typeface="+mn-ea"/>
-          <a:cs typeface="+mn-cs"/>
+          <a:latin typeface="Avenir Next"/>
+          <a:ea typeface="Avenir Next"/>
+          <a:cs typeface="Avenir Next"/>
           <a:sym typeface="Avenir Next"/>
         </a:defRPr>
       </a:lvl3pPr>
-      <a:lvl4pPr marL="2540000" marR="0" indent="-635000" algn="l" defTabSz="825500" latinLnBrk="0">
+      <a:lvl4pPr marL="2847975" marR="0" indent="-714375" algn="l" defTabSz="825500" rtl="0" latinLnBrk="0">
         <a:lnSpc>
           <a:spcPct val="100000"/>
         </a:lnSpc>
@@ -2554,18 +2548,18 @@
         <a:buFontTx/>
         <a:buChar char="•"/>
         <a:tabLst/>
-        <a:defRPr sz="5200" b="1" i="0" u="none" strike="noStrike" cap="none" spc="0" baseline="0">
+        <a:defRPr sz="5400" b="1" i="0" u="none" strike="noStrike" cap="none" spc="0" baseline="0">
           <a:solidFill>
             <a:srgbClr val="000000"/>
           </a:solidFill>
           <a:uFillTx/>
-          <a:latin typeface="+mn-lt"/>
-          <a:ea typeface="+mn-ea"/>
-          <a:cs typeface="+mn-cs"/>
+          <a:latin typeface="Avenir Next"/>
+          <a:ea typeface="Avenir Next"/>
+          <a:cs typeface="Avenir Next"/>
           <a:sym typeface="Avenir Next"/>
         </a:defRPr>
       </a:lvl4pPr>
-      <a:lvl5pPr marL="3175000" marR="0" indent="-635000" algn="l" defTabSz="825500" latinLnBrk="0">
+      <a:lvl5pPr marL="3559175" marR="0" indent="-714375" algn="l" defTabSz="825500" rtl="0" latinLnBrk="0">
         <a:lnSpc>
           <a:spcPct val="100000"/>
         </a:lnSpc>
@@ -2580,18 +2574,18 @@
         <a:buFontTx/>
         <a:buChar char="•"/>
         <a:tabLst/>
-        <a:defRPr sz="5200" b="1" i="0" u="none" strike="noStrike" cap="none" spc="0" baseline="0">
+        <a:defRPr sz="5400" b="1" i="0" u="none" strike="noStrike" cap="none" spc="0" baseline="0">
           <a:solidFill>
             <a:srgbClr val="000000"/>
           </a:solidFill>
           <a:uFillTx/>
-          <a:latin typeface="+mn-lt"/>
-          <a:ea typeface="+mn-ea"/>
-          <a:cs typeface="+mn-cs"/>
+          <a:latin typeface="Avenir Next"/>
+          <a:ea typeface="Avenir Next"/>
+          <a:cs typeface="Avenir Next"/>
           <a:sym typeface="Avenir Next"/>
         </a:defRPr>
       </a:lvl5pPr>
-      <a:lvl6pPr marL="3810000" marR="0" indent="-635000" algn="l" defTabSz="825500" latinLnBrk="0">
+      <a:lvl6pPr marL="3834422" marR="0" indent="-659422" algn="l" defTabSz="825500" rtl="0" latinLnBrk="0">
         <a:lnSpc>
           <a:spcPct val="100000"/>
         </a:lnSpc>
@@ -2606,18 +2600,18 @@
         <a:buFontTx/>
         <a:buChar char="•"/>
         <a:tabLst/>
-        <a:defRPr sz="5200" b="1" i="0" u="none" strike="noStrike" cap="none" spc="0" baseline="0">
+        <a:defRPr sz="5400" b="1" i="0" u="none" strike="noStrike" cap="none" spc="0" baseline="0">
           <a:solidFill>
             <a:srgbClr val="000000"/>
           </a:solidFill>
           <a:uFillTx/>
-          <a:latin typeface="+mn-lt"/>
-          <a:ea typeface="+mn-ea"/>
-          <a:cs typeface="+mn-cs"/>
+          <a:latin typeface="Avenir Next"/>
+          <a:ea typeface="Avenir Next"/>
+          <a:cs typeface="Avenir Next"/>
           <a:sym typeface="Avenir Next"/>
         </a:defRPr>
       </a:lvl6pPr>
-      <a:lvl7pPr marL="4445000" marR="0" indent="-635000" algn="l" defTabSz="825500" latinLnBrk="0">
+      <a:lvl7pPr marL="4469422" marR="0" indent="-659422" algn="l" defTabSz="825500" rtl="0" latinLnBrk="0">
         <a:lnSpc>
           <a:spcPct val="100000"/>
         </a:lnSpc>
@@ -2632,18 +2626,18 @@
         <a:buFontTx/>
         <a:buChar char="•"/>
         <a:tabLst/>
-        <a:defRPr sz="5200" b="1" i="0" u="none" strike="noStrike" cap="none" spc="0" baseline="0">
+        <a:defRPr sz="5400" b="1" i="0" u="none" strike="noStrike" cap="none" spc="0" baseline="0">
           <a:solidFill>
             <a:srgbClr val="000000"/>
           </a:solidFill>
           <a:uFillTx/>
-          <a:latin typeface="+mn-lt"/>
-          <a:ea typeface="+mn-ea"/>
-          <a:cs typeface="+mn-cs"/>
+          <a:latin typeface="Avenir Next"/>
+          <a:ea typeface="Avenir Next"/>
+          <a:cs typeface="Avenir Next"/>
           <a:sym typeface="Avenir Next"/>
         </a:defRPr>
       </a:lvl7pPr>
-      <a:lvl8pPr marL="5080000" marR="0" indent="-635000" algn="l" defTabSz="825500" latinLnBrk="0">
+      <a:lvl8pPr marL="5104422" marR="0" indent="-659422" algn="l" defTabSz="825500" rtl="0" latinLnBrk="0">
         <a:lnSpc>
           <a:spcPct val="100000"/>
         </a:lnSpc>
@@ -2658,18 +2652,18 @@
         <a:buFontTx/>
         <a:buChar char="•"/>
         <a:tabLst/>
-        <a:defRPr sz="5200" b="1" i="0" u="none" strike="noStrike" cap="none" spc="0" baseline="0">
+        <a:defRPr sz="5400" b="1" i="0" u="none" strike="noStrike" cap="none" spc="0" baseline="0">
           <a:solidFill>
             <a:srgbClr val="000000"/>
           </a:solidFill>
           <a:uFillTx/>
-          <a:latin typeface="+mn-lt"/>
-          <a:ea typeface="+mn-ea"/>
-          <a:cs typeface="+mn-cs"/>
+          <a:latin typeface="Avenir Next"/>
+          <a:ea typeface="Avenir Next"/>
+          <a:cs typeface="Avenir Next"/>
           <a:sym typeface="Avenir Next"/>
         </a:defRPr>
       </a:lvl8pPr>
-      <a:lvl9pPr marL="5715000" marR="0" indent="-635000" algn="l" defTabSz="825500" latinLnBrk="0">
+      <a:lvl9pPr marL="5739422" marR="0" indent="-659422" algn="l" defTabSz="825500" rtl="0" latinLnBrk="0">
         <a:lnSpc>
           <a:spcPct val="100000"/>
         </a:lnSpc>
@@ -2684,20 +2678,20 @@
         <a:buFontTx/>
         <a:buChar char="•"/>
         <a:tabLst/>
-        <a:defRPr sz="5200" b="1" i="0" u="none" strike="noStrike" cap="none" spc="0" baseline="0">
+        <a:defRPr sz="5400" b="1" i="0" u="none" strike="noStrike" cap="none" spc="0" baseline="0">
           <a:solidFill>
             <a:srgbClr val="000000"/>
           </a:solidFill>
           <a:uFillTx/>
-          <a:latin typeface="+mn-lt"/>
-          <a:ea typeface="+mn-ea"/>
-          <a:cs typeface="+mn-cs"/>
+          <a:latin typeface="Avenir Next"/>
+          <a:ea typeface="Avenir Next"/>
+          <a:cs typeface="Avenir Next"/>
           <a:sym typeface="Avenir Next"/>
         </a:defRPr>
       </a:lvl9pPr>
     </p:bodyStyle>
     <p:otherStyle>
-      <a:lvl1pPr marL="0" marR="0" indent="0" algn="ctr" defTabSz="825500" latinLnBrk="0">
+      <a:lvl1pPr marL="0" marR="0" indent="0" algn="ctr" defTabSz="825500" rtl="0" latinLnBrk="0">
         <a:lnSpc>
           <a:spcPct val="100000"/>
         </a:lnSpc>
@@ -2723,7 +2717,7 @@
           <a:sym typeface="Helvetica Neue Light"/>
         </a:defRPr>
       </a:lvl1pPr>
-      <a:lvl2pPr marL="0" marR="0" indent="228600" algn="ctr" defTabSz="825500" latinLnBrk="0">
+      <a:lvl2pPr marL="0" marR="0" indent="0" algn="ctr" defTabSz="825500" rtl="0" latinLnBrk="0">
         <a:lnSpc>
           <a:spcPct val="100000"/>
         </a:lnSpc>
@@ -2749,7 +2743,7 @@
           <a:sym typeface="Helvetica Neue Light"/>
         </a:defRPr>
       </a:lvl2pPr>
-      <a:lvl3pPr marL="0" marR="0" indent="457200" algn="ctr" defTabSz="825500" latinLnBrk="0">
+      <a:lvl3pPr marL="0" marR="0" indent="0" algn="ctr" defTabSz="825500" rtl="0" latinLnBrk="0">
         <a:lnSpc>
           <a:spcPct val="100000"/>
         </a:lnSpc>
@@ -2775,7 +2769,7 @@
           <a:sym typeface="Helvetica Neue Light"/>
         </a:defRPr>
       </a:lvl3pPr>
-      <a:lvl4pPr marL="0" marR="0" indent="685800" algn="ctr" defTabSz="825500" latinLnBrk="0">
+      <a:lvl4pPr marL="0" marR="0" indent="0" algn="ctr" defTabSz="825500" rtl="0" latinLnBrk="0">
         <a:lnSpc>
           <a:spcPct val="100000"/>
         </a:lnSpc>
@@ -2801,7 +2795,7 @@
           <a:sym typeface="Helvetica Neue Light"/>
         </a:defRPr>
       </a:lvl4pPr>
-      <a:lvl5pPr marL="0" marR="0" indent="914400" algn="ctr" defTabSz="825500" latinLnBrk="0">
+      <a:lvl5pPr marL="0" marR="0" indent="0" algn="ctr" defTabSz="825500" rtl="0" latinLnBrk="0">
         <a:lnSpc>
           <a:spcPct val="100000"/>
         </a:lnSpc>
@@ -2827,7 +2821,7 @@
           <a:sym typeface="Helvetica Neue Light"/>
         </a:defRPr>
       </a:lvl5pPr>
-      <a:lvl6pPr marL="0" marR="0" indent="1143000" algn="ctr" defTabSz="825500" latinLnBrk="0">
+      <a:lvl6pPr marL="0" marR="0" indent="0" algn="ctr" defTabSz="825500" rtl="0" latinLnBrk="0">
         <a:lnSpc>
           <a:spcPct val="100000"/>
         </a:lnSpc>
@@ -2853,7 +2847,7 @@
           <a:sym typeface="Helvetica Neue Light"/>
         </a:defRPr>
       </a:lvl6pPr>
-      <a:lvl7pPr marL="0" marR="0" indent="1371600" algn="ctr" defTabSz="825500" latinLnBrk="0">
+      <a:lvl7pPr marL="0" marR="0" indent="0" algn="ctr" defTabSz="825500" rtl="0" latinLnBrk="0">
         <a:lnSpc>
           <a:spcPct val="100000"/>
         </a:lnSpc>
@@ -2879,7 +2873,7 @@
           <a:sym typeface="Helvetica Neue Light"/>
         </a:defRPr>
       </a:lvl7pPr>
-      <a:lvl8pPr marL="0" marR="0" indent="1600200" algn="ctr" defTabSz="825500" latinLnBrk="0">
+      <a:lvl8pPr marL="0" marR="0" indent="0" algn="ctr" defTabSz="825500" rtl="0" latinLnBrk="0">
         <a:lnSpc>
           <a:spcPct val="100000"/>
         </a:lnSpc>
@@ -2905,7 +2899,7 @@
           <a:sym typeface="Helvetica Neue Light"/>
         </a:defRPr>
       </a:lvl8pPr>
-      <a:lvl9pPr marL="0" marR="0" indent="1828800" algn="ctr" defTabSz="825500" latinLnBrk="0">
+      <a:lvl9pPr marL="0" marR="0" indent="0" algn="ctr" defTabSz="825500" rtl="0" latinLnBrk="0">
         <a:lnSpc>
           <a:spcPct val="100000"/>
         </a:lnSpc>
@@ -2955,7 +2949,7 @@
       </p:grpSpPr>
       <p:sp>
         <p:nvSpPr>
-          <p:cNvPr id="119" name="Assignment 1"/>
+          <p:cNvPr id="119" name="Projects"/>
           <p:cNvSpPr txBox="1">
             <a:spLocks noGrp="1"/>
           </p:cNvSpPr>
@@ -2977,7 +2971,7 @@
           <a:lstStyle/>
           <a:p>
             <a:r>
-              <a:t>Assignment 1</a:t>
+              <a:t>Projects</a:t>
             </a:r>
           </a:p>
         </p:txBody>
@@ -2990,8 +2984,8 @@
         </p:nvSpPr>
         <p:spPr>
           <a:xfrm>
-            <a:off x="1779441" y="7493000"/>
-            <a:ext cx="20825118" cy="0"/>
+            <a:off x="1779440" y="7493000"/>
+            <a:ext cx="20825120" cy="0"/>
           </a:xfrm>
           <a:prstGeom prst="line">
             <a:avLst/>
@@ -3004,23 +2998,9 @@
           </a:ln>
         </p:spPr>
         <p:txBody>
-          <a:bodyPr lIns="0" tIns="0" rIns="0" bIns="0" anchor="ctr"/>
+          <a:bodyPr lIns="45718" tIns="45718" rIns="45718" bIns="45718"/>
           <a:lstStyle/>
           <a:p>
-            <a:pPr algn="ctr">
-              <a:spcBef>
-                <a:spcPts val="0"/>
-              </a:spcBef>
-              <a:defRPr sz="3200" b="0">
-                <a:solidFill>
-                  <a:srgbClr val="FFFFFF"/>
-                </a:solidFill>
-                <a:latin typeface="Helvetica Neue Medium"/>
-                <a:ea typeface="Helvetica Neue Medium"/>
-                <a:cs typeface="Helvetica Neue Medium"/>
-                <a:sym typeface="Helvetica Neue Medium"/>
-              </a:defRPr>
-            </a:pPr>
             <a:endParaRPr/>
           </a:p>
         </p:txBody>
@@ -3033,8 +3013,8 @@
         </p:nvSpPr>
         <p:spPr>
           <a:xfrm>
-            <a:off x="16022570" y="762239"/>
-            <a:ext cx="6583430" cy="6095761"/>
+            <a:off x="16022569" y="762238"/>
+            <a:ext cx="6583431" cy="6095763"/>
           </a:xfrm>
           <a:prstGeom prst="rect">
             <a:avLst/>
@@ -3061,7 +3041,6 @@
               <a:defRPr sz="3600"/>
             </a:pPr>
             <a:r>
-              <a:rPr dirty="0"/>
               <a:t>Learning goals:</a:t>
             </a:r>
           </a:p>
@@ -3071,21 +3050,11 @@
                 <a:spcPts val="0"/>
               </a:spcBef>
               <a:buSzPct val="125000"/>
-              <a:buFontTx/>
               <a:buChar char="•"/>
               <a:defRPr sz="3600"/>
             </a:pPr>
             <a:r>
-              <a:rPr lang="en-US" dirty="0"/>
-              <a:t>What is Git + </a:t>
-            </a:r>
-            <a:r>
-              <a:rPr lang="en-US" dirty="0" err="1"/>
-              <a:t>Github</a:t>
-            </a:r>
-            <a:r>
-              <a:rPr lang="en-US" dirty="0"/>
-              <a:t>?</a:t>
+              <a:t>Get some tips for feasible and interesting project proposals.</a:t>
             </a:r>
           </a:p>
           <a:p>
@@ -3094,15 +3063,25 @@
                 <a:spcPts val="0"/>
               </a:spcBef>
               <a:buSzPct val="125000"/>
-              <a:buFontTx/>
               <a:buChar char="•"/>
               <a:defRPr sz="3600"/>
             </a:pPr>
             <a:r>
-              <a:rPr dirty="0"/>
-              <a:t>Check your work for the GitHub portion of A1.</a:t>
-            </a:r>
-            <a:endParaRPr lang="en-US" dirty="0"/>
+              <a:t>See some examples of interesting research questions.</a:t>
+            </a:r>
+          </a:p>
+          <a:p>
+            <a:pPr marL="714375" indent="-714375">
+              <a:spcBef>
+                <a:spcPts val="0"/>
+              </a:spcBef>
+              <a:buSzPct val="125000"/>
+              <a:buChar char="•"/>
+              <a:defRPr sz="3600"/>
+            </a:pPr>
+            <a:r>
+              <a:t>Pause to talk about Pandas</a:t>
+            </a:r>
           </a:p>
         </p:txBody>
       </p:sp>
@@ -3118,7 +3097,7 @@
         </p:nvSpPr>
         <p:spPr>
           <a:xfrm>
-            <a:off x="1778000" y="8608615"/>
+            <a:off x="1778000" y="8608614"/>
             <a:ext cx="10414000" cy="3860561"/>
           </a:xfrm>
           <a:prstGeom prst="rect">
@@ -3146,8 +3125,9 @@
             <a:pPr algn="l"/>
             <a:r>
               <a:rPr lang="en-US" dirty="0"/>
-              <a:t>Discussion 1</a:t>
-            </a:r>
+              <a:t>Discussion 2</a:t>
+            </a:r>
+            <a:endParaRPr dirty="0"/>
           </a:p>
         </p:txBody>
       </p:sp>
@@ -3159,8 +3139,8 @@
         </p:nvSpPr>
         <p:spPr>
           <a:xfrm>
-            <a:off x="12192000" y="8608615"/>
-            <a:ext cx="10860543" cy="3860561"/>
+            <a:off x="12191999" y="8608614"/>
+            <a:ext cx="10860545" cy="3860561"/>
           </a:xfrm>
           <a:prstGeom prst="rect">
             <a:avLst/>
@@ -3184,12 +3164,35 @@
               <a:spcBef>
                 <a:spcPts val="0"/>
               </a:spcBef>
+              <a:defRPr u="sng"/>
             </a:pPr>
             <a:r>
-              <a:rPr lang="en-US" u="sng" dirty="0">
+              <a:rPr lang="en-US" dirty="0">
+                <a:solidFill>
+                  <a:srgbClr val="0000FF"/>
+                </a:solidFill>
+                <a:uFill>
+                  <a:solidFill>
+                    <a:srgbClr val="0000FF"/>
+                  </a:solidFill>
+                </a:uFill>
                 <a:hlinkClick r:id="rId2"/>
               </a:rPr>
-              <a:t>yyt005@ucsd.edu</a:t>
+              <a:t>yyt005</a:t>
+            </a:r>
+            <a:r>
+              <a:rPr dirty="0">
+                <a:solidFill>
+                  <a:srgbClr val="0000FF"/>
+                </a:solidFill>
+                <a:uFill>
+                  <a:solidFill>
+                    <a:srgbClr val="0000FF"/>
+                  </a:solidFill>
+                </a:uFill>
+                <a:hlinkClick r:id="rId2"/>
+              </a:rPr>
+              <a:t>@ucsd.edu</a:t>
             </a:r>
           </a:p>
           <a:p>
@@ -3199,78 +3202,22 @@
               </a:spcBef>
             </a:pPr>
             <a:r>
+              <a:rPr dirty="0"/>
+              <a:t>OH: </a:t>
+            </a:r>
+            <a:r>
               <a:rPr lang="en-US" dirty="0"/>
-              <a:t>OH: Mon </a:t>
-            </a:r>
-            <a:r>
-              <a:rPr lang="en-US" altLang="zh-CN" dirty="0"/>
-              <a:t>10</a:t>
+              <a:t>Mon</a:t>
+            </a:r>
+            <a:r>
+              <a:rPr dirty="0"/>
+              <a:t> 10a-11a </a:t>
             </a:r>
             <a:r>
               <a:rPr lang="en-US" dirty="0"/>
-              <a:t>a-1</a:t>
-            </a:r>
-            <a:r>
-              <a:rPr lang="en-US" altLang="zh-CN" dirty="0"/>
-              <a:t>1</a:t>
-            </a:r>
-            <a:r>
-              <a:rPr lang="en-US" dirty="0"/>
-              <a:t>a at M.O.M’s Cafe </a:t>
-            </a:r>
-          </a:p>
-        </p:txBody>
-      </p:sp>
-      <p:sp>
-        <p:nvSpPr>
-          <p:cNvPr id="3" name="TextBox 2">
-            <a:extLst>
-              <a:ext uri="{FF2B5EF4-FFF2-40B4-BE49-F238E27FC236}">
-                <a16:creationId xmlns:a16="http://schemas.microsoft.com/office/drawing/2014/main" id="{F03E9008-80F9-B986-6257-9EC63CDA24D6}"/>
-              </a:ext>
-            </a:extLst>
-          </p:cNvPr>
-          <p:cNvSpPr txBox="1"/>
-          <p:nvPr/>
-        </p:nvSpPr>
-        <p:spPr>
-          <a:xfrm>
-            <a:off x="1722717" y="12676762"/>
-            <a:ext cx="17591568" cy="553998"/>
-          </a:xfrm>
-          <a:prstGeom prst="rect">
-            <a:avLst/>
-          </a:prstGeom>
-          <a:noFill/>
-          <a:ln w="12700" cap="flat">
-            <a:noFill/>
-            <a:miter lim="400000"/>
-          </a:ln>
-          <a:effectLst/>
-          <a:sp3d/>
-        </p:spPr>
-        <p:style>
-          <a:lnRef idx="0">
-            <a:scrgbClr r="0" g="0" b="0"/>
-          </a:lnRef>
-          <a:fillRef idx="0">
-            <a:scrgbClr r="0" g="0" b="0"/>
-          </a:fillRef>
-          <a:effectRef idx="0">
-            <a:scrgbClr r="0" g="0" b="0"/>
-          </a:effectRef>
-          <a:fontRef idx="none"/>
-        </p:style>
-        <p:txBody>
-          <a:bodyPr wrap="square">
-            <a:spAutoFit/>
-          </a:bodyPr>
-          <a:lstStyle/>
-          <a:p>
-            <a:r>
-              <a:rPr lang="en-US" sz="3000" dirty="0"/>
-              <a:t>Discussion slides and materials adapted from Will McCarthy (TA: SP20)</a:t>
-            </a:r>
+              <a:t>at M.O.M’s Cafe</a:t>
+            </a:r>
+            <a:endParaRPr dirty="0"/>
           </a:p>
         </p:txBody>
       </p:sp>
@@ -3302,63 +3249,7 @@
       </p:grpSpPr>
       <p:sp>
         <p:nvSpPr>
-          <p:cNvPr id="128" name="Somewhere online to store a copy of a project (Github)…"/>
-          <p:cNvSpPr txBox="1">
-            <a:spLocks noGrp="1"/>
-          </p:cNvSpPr>
-          <p:nvPr>
-            <p:ph type="body" sz="half" idx="1"/>
-          </p:nvPr>
-        </p:nvSpPr>
-        <p:spPr>
-          <a:xfrm>
-            <a:off x="1689100" y="3149600"/>
-            <a:ext cx="14253929" cy="9332904"/>
-          </a:xfrm>
-          <a:prstGeom prst="rect">
-            <a:avLst/>
-          </a:prstGeom>
-        </p:spPr>
-        <p:txBody>
-          <a:bodyPr/>
-          <a:lstStyle/>
-          <a:p>
-            <a:pPr>
-              <a:defRPr b="0"/>
-            </a:pPr>
-            <a:r>
-              <a:t>Somewhere online to store a copy of a project (Github)</a:t>
-            </a:r>
-          </a:p>
-          <a:p>
-            <a:pPr>
-              <a:defRPr b="0"/>
-            </a:pPr>
-            <a:r>
-              <a:t>Plus a tool to interact with this copy (Git)</a:t>
-            </a:r>
-          </a:p>
-          <a:p>
-            <a:pPr lvl="1">
-              <a:defRPr b="0"/>
-            </a:pPr>
-            <a:r>
-              <a:t>Command line and desktop versions</a:t>
-            </a:r>
-          </a:p>
-          <a:p>
-            <a:pPr>
-              <a:defRPr b="0"/>
-            </a:pPr>
-            <a:r>
-              <a:t>A way of keeping track of changes you make to this project</a:t>
-            </a:r>
-          </a:p>
-        </p:txBody>
-      </p:sp>
-      <p:sp>
-        <p:nvSpPr>
-          <p:cNvPr id="129" name="What is Git + GitHub?"/>
+          <p:cNvPr id="128" name="Guide for a Good Project Proposal"/>
           <p:cNvSpPr txBox="1">
             <a:spLocks noGrp="1"/>
           </p:cNvSpPr>
@@ -3373,492 +3264,21 @@
         </p:spPr>
         <p:txBody>
           <a:bodyPr/>
-          <a:lstStyle/>
-          <a:p>
-            <a:r>
-              <a:t>What is Git + GitHub?</a:t>
+          <a:lstStyle>
+            <a:lvl1pPr defTabSz="734694">
+              <a:defRPr sz="9900"/>
+            </a:lvl1pPr>
+          </a:lstStyle>
+          <a:p>
+            <a:r>
+              <a:t>Guide for a Good Project Proposal</a:t>
             </a:r>
           </a:p>
         </p:txBody>
       </p:sp>
       <p:sp>
         <p:nvSpPr>
-          <p:cNvPr id="130" name="repo"/>
-          <p:cNvSpPr/>
-          <p:nvPr/>
-        </p:nvSpPr>
-        <p:spPr>
-          <a:xfrm>
-            <a:off x="18716742" y="6222999"/>
-            <a:ext cx="2287220" cy="1270001"/>
-          </a:xfrm>
-          <a:prstGeom prst="rect">
-            <a:avLst/>
-          </a:prstGeom>
-          <a:solidFill>
-            <a:schemeClr val="accent1"/>
-          </a:solidFill>
-          <a:ln w="12700">
-            <a:miter lim="400000"/>
-          </a:ln>
-          <a:extLst>
-            <a:ext uri="{C572A759-6A51-4108-AA02-DFA0A04FC94B}">
-              <ma14:wrappingTextBoxFlag xmlns:ma14="http://schemas.microsoft.com/office/mac/drawingml/2011/main" xmlns:a14="http://schemas.microsoft.com/office/drawing/2010/main" xmlns:m="http://schemas.openxmlformats.org/officeDocument/2006/math" xmlns="" val="1"/>
-            </a:ext>
-          </a:extLst>
-        </p:spPr>
-        <p:txBody>
-          <a:bodyPr lIns="0" tIns="0" rIns="0" bIns="0" anchor="ctr"/>
-          <a:lstStyle>
-            <a:lvl1pPr algn="ctr">
-              <a:spcBef>
-                <a:spcPts val="0"/>
-              </a:spcBef>
-              <a:defRPr sz="3200" b="0">
-                <a:solidFill>
-                  <a:srgbClr val="FFFFFF"/>
-                </a:solidFill>
-                <a:latin typeface="Helvetica Neue Medium"/>
-                <a:ea typeface="Helvetica Neue Medium"/>
-                <a:cs typeface="Helvetica Neue Medium"/>
-                <a:sym typeface="Helvetica Neue Medium"/>
-              </a:defRPr>
-            </a:lvl1pPr>
-          </a:lstStyle>
-          <a:p>
-            <a:r>
-              <a:t>repo</a:t>
-            </a:r>
-          </a:p>
-        </p:txBody>
-      </p:sp>
-      <p:sp>
-        <p:nvSpPr>
-          <p:cNvPr id="131" name="local copy"/>
-          <p:cNvSpPr/>
-          <p:nvPr/>
-        </p:nvSpPr>
-        <p:spPr>
-          <a:xfrm>
-            <a:off x="15688034" y="9194946"/>
-            <a:ext cx="2287219" cy="1270001"/>
-          </a:xfrm>
-          <a:prstGeom prst="rect">
-            <a:avLst/>
-          </a:prstGeom>
-          <a:solidFill>
-            <a:schemeClr val="accent1"/>
-          </a:solidFill>
-          <a:ln w="12700">
-            <a:miter lim="400000"/>
-          </a:ln>
-          <a:extLst>
-            <a:ext uri="{C572A759-6A51-4108-AA02-DFA0A04FC94B}">
-              <ma14:wrappingTextBoxFlag xmlns:ma14="http://schemas.microsoft.com/office/mac/drawingml/2011/main" xmlns:a14="http://schemas.microsoft.com/office/drawing/2010/main" xmlns:m="http://schemas.openxmlformats.org/officeDocument/2006/math" xmlns="" val="1"/>
-            </a:ext>
-          </a:extLst>
-        </p:spPr>
-        <p:txBody>
-          <a:bodyPr lIns="0" tIns="0" rIns="0" bIns="0" anchor="ctr"/>
-          <a:lstStyle>
-            <a:lvl1pPr algn="ctr">
-              <a:spcBef>
-                <a:spcPts val="0"/>
-              </a:spcBef>
-              <a:defRPr sz="3200" b="0">
-                <a:solidFill>
-                  <a:srgbClr val="FFFFFF"/>
-                </a:solidFill>
-                <a:latin typeface="Helvetica Neue Medium"/>
-                <a:ea typeface="Helvetica Neue Medium"/>
-                <a:cs typeface="Helvetica Neue Medium"/>
-                <a:sym typeface="Helvetica Neue Medium"/>
-              </a:defRPr>
-            </a:lvl1pPr>
-          </a:lstStyle>
-          <a:p>
-            <a:r>
-              <a:t>local copy</a:t>
-            </a:r>
-          </a:p>
-        </p:txBody>
-      </p:sp>
-      <p:sp>
-        <p:nvSpPr>
-          <p:cNvPr id="132" name="Fork of project"/>
-          <p:cNvSpPr/>
-          <p:nvPr/>
-        </p:nvSpPr>
-        <p:spPr>
-          <a:xfrm>
-            <a:off x="18640098" y="9194946"/>
-            <a:ext cx="2287220" cy="1270001"/>
-          </a:xfrm>
-          <a:prstGeom prst="roundRect">
-            <a:avLst>
-              <a:gd name="adj" fmla="val 11912"/>
-            </a:avLst>
-          </a:prstGeom>
-          <a:solidFill>
-            <a:schemeClr val="accent2"/>
-          </a:solidFill>
-          <a:ln w="12700">
-            <a:miter lim="400000"/>
-          </a:ln>
-          <a:extLst>
-            <a:ext uri="{C572A759-6A51-4108-AA02-DFA0A04FC94B}">
-              <ma14:wrappingTextBoxFlag xmlns:ma14="http://schemas.microsoft.com/office/mac/drawingml/2011/main" xmlns:a14="http://schemas.microsoft.com/office/drawing/2010/main" xmlns:m="http://schemas.openxmlformats.org/officeDocument/2006/math" xmlns="" val="1"/>
-            </a:ext>
-          </a:extLst>
-        </p:spPr>
-        <p:txBody>
-          <a:bodyPr lIns="0" tIns="0" rIns="0" bIns="0" anchor="ctr"/>
-          <a:lstStyle>
-            <a:lvl1pPr algn="ctr">
-              <a:spcBef>
-                <a:spcPts val="0"/>
-              </a:spcBef>
-              <a:defRPr sz="3200" b="0">
-                <a:solidFill>
-                  <a:srgbClr val="FFFFFF"/>
-                </a:solidFill>
-                <a:latin typeface="Helvetica Neue Medium"/>
-                <a:ea typeface="Helvetica Neue Medium"/>
-                <a:cs typeface="Helvetica Neue Medium"/>
-                <a:sym typeface="Helvetica Neue Medium"/>
-              </a:defRPr>
-            </a:lvl1pPr>
-          </a:lstStyle>
-          <a:p>
-            <a:r>
-              <a:t>Fork of project</a:t>
-            </a:r>
-          </a:p>
-        </p:txBody>
-      </p:sp>
-      <p:sp>
-        <p:nvSpPr>
-          <p:cNvPr id="133" name="Line"/>
-          <p:cNvSpPr/>
-          <p:nvPr/>
-        </p:nvSpPr>
-        <p:spPr>
-          <a:xfrm flipV="1">
-            <a:off x="17383886" y="7569023"/>
-            <a:ext cx="1884738" cy="1630799"/>
-          </a:xfrm>
-          <a:prstGeom prst="line">
-            <a:avLst/>
-          </a:prstGeom>
-          <a:ln w="25400">
-            <a:solidFill>
-              <a:srgbClr val="000000"/>
-            </a:solidFill>
-            <a:miter lim="400000"/>
-            <a:tailEnd type="triangle"/>
-          </a:ln>
-        </p:spPr>
-        <p:txBody>
-          <a:bodyPr lIns="0" tIns="0" rIns="0" bIns="0" anchor="ctr"/>
-          <a:lstStyle/>
-          <a:p>
-            <a:pPr algn="ctr">
-              <a:spcBef>
-                <a:spcPts val="0"/>
-              </a:spcBef>
-              <a:defRPr sz="3200" b="0">
-                <a:solidFill>
-                  <a:srgbClr val="FFFFFF"/>
-                </a:solidFill>
-                <a:latin typeface="Helvetica Neue Medium"/>
-                <a:ea typeface="Helvetica Neue Medium"/>
-                <a:cs typeface="Helvetica Neue Medium"/>
-                <a:sym typeface="Helvetica Neue Medium"/>
-              </a:defRPr>
-            </a:pPr>
-            <a:endParaRPr/>
-          </a:p>
-        </p:txBody>
-      </p:sp>
-      <p:sp>
-        <p:nvSpPr>
-          <p:cNvPr id="134" name="Line"/>
-          <p:cNvSpPr/>
-          <p:nvPr/>
-        </p:nvSpPr>
-        <p:spPr>
-          <a:xfrm flipV="1">
-            <a:off x="19860352" y="7578627"/>
-            <a:ext cx="1" cy="1621195"/>
-          </a:xfrm>
-          <a:prstGeom prst="line">
-            <a:avLst/>
-          </a:prstGeom>
-          <a:ln w="25400">
-            <a:solidFill>
-              <a:srgbClr val="000000"/>
-            </a:solidFill>
-            <a:miter lim="400000"/>
-            <a:tailEnd type="triangle"/>
-          </a:ln>
-        </p:spPr>
-        <p:txBody>
-          <a:bodyPr lIns="0" tIns="0" rIns="0" bIns="0" anchor="ctr"/>
-          <a:lstStyle/>
-          <a:p>
-            <a:pPr algn="ctr">
-              <a:spcBef>
-                <a:spcPts val="0"/>
-              </a:spcBef>
-              <a:defRPr sz="3200" b="0">
-                <a:solidFill>
-                  <a:srgbClr val="FFFFFF"/>
-                </a:solidFill>
-                <a:latin typeface="Helvetica Neue Medium"/>
-                <a:ea typeface="Helvetica Neue Medium"/>
-                <a:cs typeface="Helvetica Neue Medium"/>
-                <a:sym typeface="Helvetica Neue Medium"/>
-              </a:defRPr>
-            </a:pPr>
-            <a:endParaRPr/>
-          </a:p>
-        </p:txBody>
-      </p:sp>
-      <p:sp>
-        <p:nvSpPr>
-          <p:cNvPr id="135" name="Old copy"/>
-          <p:cNvSpPr/>
-          <p:nvPr/>
-        </p:nvSpPr>
-        <p:spPr>
-          <a:xfrm>
-            <a:off x="21872977" y="9194946"/>
-            <a:ext cx="1899181" cy="1270001"/>
-          </a:xfrm>
-          <a:prstGeom prst="rect">
-            <a:avLst/>
-          </a:prstGeom>
-          <a:solidFill>
-            <a:schemeClr val="accent1">
-              <a:lumOff val="16847"/>
-            </a:schemeClr>
-          </a:solidFill>
-          <a:ln w="12700">
-            <a:miter lim="400000"/>
-          </a:ln>
-          <a:extLst>
-            <a:ext uri="{C572A759-6A51-4108-AA02-DFA0A04FC94B}">
-              <ma14:wrappingTextBoxFlag xmlns:ma14="http://schemas.microsoft.com/office/mac/drawingml/2011/main" xmlns:a14="http://schemas.microsoft.com/office/drawing/2010/main" xmlns:m="http://schemas.openxmlformats.org/officeDocument/2006/math" xmlns="" val="1"/>
-            </a:ext>
-          </a:extLst>
-        </p:spPr>
-        <p:txBody>
-          <a:bodyPr lIns="0" tIns="0" rIns="0" bIns="0" anchor="ctr"/>
-          <a:lstStyle>
-            <a:lvl1pPr algn="ctr">
-              <a:spcBef>
-                <a:spcPts val="0"/>
-              </a:spcBef>
-              <a:defRPr sz="3200" b="0">
-                <a:solidFill>
-                  <a:srgbClr val="FFFFFF"/>
-                </a:solidFill>
-                <a:latin typeface="Helvetica Neue Medium"/>
-                <a:ea typeface="Helvetica Neue Medium"/>
-                <a:cs typeface="Helvetica Neue Medium"/>
-                <a:sym typeface="Helvetica Neue Medium"/>
-              </a:defRPr>
-            </a:lvl1pPr>
-          </a:lstStyle>
-          <a:p>
-            <a:r>
-              <a:t>Old copy</a:t>
-            </a:r>
-          </a:p>
-        </p:txBody>
-      </p:sp>
-      <p:sp>
-        <p:nvSpPr>
-          <p:cNvPr id="136" name="Line"/>
-          <p:cNvSpPr/>
-          <p:nvPr/>
-        </p:nvSpPr>
-        <p:spPr>
-          <a:xfrm flipH="1" flipV="1">
-            <a:off x="20452069" y="7578630"/>
-            <a:ext cx="2279911" cy="1610809"/>
-          </a:xfrm>
-          <a:prstGeom prst="line">
-            <a:avLst/>
-          </a:prstGeom>
-          <a:ln w="25400">
-            <a:solidFill>
-              <a:srgbClr val="000000"/>
-            </a:solidFill>
-            <a:miter lim="400000"/>
-            <a:tailEnd type="triangle"/>
-          </a:ln>
-        </p:spPr>
-        <p:txBody>
-          <a:bodyPr lIns="0" tIns="0" rIns="0" bIns="0" anchor="ctr"/>
-          <a:lstStyle/>
-          <a:p>
-            <a:pPr algn="ctr">
-              <a:spcBef>
-                <a:spcPts val="0"/>
-              </a:spcBef>
-              <a:defRPr sz="3200" b="0">
-                <a:solidFill>
-                  <a:srgbClr val="FFFFFF"/>
-                </a:solidFill>
-                <a:latin typeface="Helvetica Neue Medium"/>
-                <a:ea typeface="Helvetica Neue Medium"/>
-                <a:cs typeface="Helvetica Neue Medium"/>
-                <a:sym typeface="Helvetica Neue Medium"/>
-              </a:defRPr>
-            </a:pPr>
-            <a:endParaRPr/>
-          </a:p>
-        </p:txBody>
-      </p:sp>
-      <p:sp>
-        <p:nvSpPr>
-          <p:cNvPr id="137" name="Rounded Rectangle"/>
-          <p:cNvSpPr/>
-          <p:nvPr/>
-        </p:nvSpPr>
-        <p:spPr>
-          <a:xfrm>
-            <a:off x="18072209" y="5120952"/>
-            <a:ext cx="3923290" cy="2802959"/>
-          </a:xfrm>
-          <a:prstGeom prst="roundRect">
-            <a:avLst>
-              <a:gd name="adj" fmla="val 15034"/>
-            </a:avLst>
-          </a:prstGeom>
-          <a:ln w="50800">
-            <a:solidFill>
-              <a:srgbClr val="000000"/>
-            </a:solidFill>
-            <a:miter lim="400000"/>
-          </a:ln>
-        </p:spPr>
-        <p:txBody>
-          <a:bodyPr lIns="0" tIns="0" rIns="0" bIns="0" anchor="ctr"/>
-          <a:lstStyle/>
-          <a:p>
-            <a:pPr algn="ctr">
-              <a:spcBef>
-                <a:spcPts val="0"/>
-              </a:spcBef>
-              <a:defRPr sz="3200" b="0">
-                <a:solidFill>
-                  <a:srgbClr val="FFFFFF"/>
-                </a:solidFill>
-                <a:latin typeface="Helvetica Neue Medium"/>
-                <a:ea typeface="Helvetica Neue Medium"/>
-                <a:cs typeface="Helvetica Neue Medium"/>
-                <a:sym typeface="Helvetica Neue Medium"/>
-              </a:defRPr>
-            </a:pPr>
-            <a:endParaRPr/>
-          </a:p>
-        </p:txBody>
-      </p:sp>
-      <p:sp>
-        <p:nvSpPr>
-          <p:cNvPr id="138" name="github"/>
-          <p:cNvSpPr txBox="1"/>
-          <p:nvPr/>
-        </p:nvSpPr>
-        <p:spPr>
-          <a:xfrm>
-            <a:off x="19935095" y="4480089"/>
-            <a:ext cx="1600201" cy="774701"/>
-          </a:xfrm>
-          <a:prstGeom prst="rect">
-            <a:avLst/>
-          </a:prstGeom>
-          <a:ln w="12700">
-            <a:miter lim="400000"/>
-          </a:ln>
-          <a:extLst>
-            <a:ext uri="{C572A759-6A51-4108-AA02-DFA0A04FC94B}">
-              <ma14:wrappingTextBoxFlag xmlns:ma14="http://schemas.microsoft.com/office/mac/drawingml/2011/main" xmlns:a14="http://schemas.microsoft.com/office/drawing/2010/main" xmlns:m="http://schemas.openxmlformats.org/officeDocument/2006/math" xmlns="" val="1"/>
-            </a:ext>
-          </a:extLst>
-        </p:spPr>
-        <p:txBody>
-          <a:bodyPr wrap="none" lIns="50800" tIns="50800" rIns="50800" bIns="50800" anchor="ctr">
-            <a:spAutoFit/>
-          </a:bodyPr>
-          <a:lstStyle>
-            <a:lvl1pPr>
-              <a:defRPr sz="3900" b="0"/>
-            </a:lvl1pPr>
-          </a:lstStyle>
-          <a:p>
-            <a:r>
-              <a:t>github</a:t>
-            </a:r>
-          </a:p>
-        </p:txBody>
-      </p:sp>
-    </p:spTree>
-  </p:cSld>
-  <p:clrMapOvr>
-    <a:masterClrMapping/>
-  </p:clrMapOvr>
-  <p:transition spd="med"/>
-</p:sld>
-</file>
-
-<file path=ppt/slides/slide3.xml><?xml version="1.0" encoding="utf-8"?>
-<p:sld xmlns:a="http://schemas.openxmlformats.org/drawingml/2006/main" xmlns:r="http://schemas.openxmlformats.org/officeDocument/2006/relationships" xmlns:p="http://schemas.openxmlformats.org/presentationml/2006/main">
-  <p:cSld>
-    <p:spTree>
-      <p:nvGrpSpPr>
-        <p:cNvPr id="1" name=""/>
-        <p:cNvGrpSpPr/>
-        <p:nvPr/>
-      </p:nvGrpSpPr>
-      <p:grpSpPr>
-        <a:xfrm>
-          <a:off x="0" y="0"/>
-          <a:ext cx="0" cy="0"/>
-          <a:chOff x="0" y="0"/>
-          <a:chExt cx="0" cy="0"/>
-        </a:xfrm>
-      </p:grpSpPr>
-      <p:sp>
-        <p:nvSpPr>
-          <p:cNvPr id="140" name="Why use Git + GitHub?"/>
-          <p:cNvSpPr txBox="1">
-            <a:spLocks noGrp="1"/>
-          </p:cNvSpPr>
-          <p:nvPr>
-            <p:ph type="title"/>
-          </p:nvPr>
-        </p:nvSpPr>
-        <p:spPr>
-          <a:prstGeom prst="rect">
-            <a:avLst/>
-          </a:prstGeom>
-        </p:spPr>
-        <p:txBody>
-          <a:bodyPr/>
-          <a:lstStyle/>
-          <a:p>
-            <a:r>
-              <a:t>Why use Git + GitHub?</a:t>
-            </a:r>
-          </a:p>
-        </p:txBody>
-      </p:sp>
-      <p:sp>
-        <p:nvSpPr>
-          <p:cNvPr id="141" name="Git allows you to work on code projects with other people. It’s the preferred tool for many projects, like:…"/>
+          <p:cNvPr id="129" name="Find 3 interesting datasets.…"/>
           <p:cNvSpPr txBox="1">
             <a:spLocks noGrp="1"/>
           </p:cNvSpPr>
@@ -3875,144 +3295,52 @@
           <a:bodyPr/>
           <a:lstStyle/>
           <a:p>
-            <a:pPr marL="542924" indent="-542924" defTabSz="627379">
-              <a:spcBef>
-                <a:spcPts val="3000"/>
-              </a:spcBef>
-              <a:defRPr sz="4104" b="0"/>
-            </a:pPr>
-            <a:r>
-              <a:t>Git allows you to work on code </a:t>
-            </a:r>
-            <a:r>
-              <a:rPr b="1"/>
-              <a:t>projects with other people</a:t>
-            </a:r>
-            <a:r>
-              <a:t>. It’s the preferred tool for many projects, like:</a:t>
-            </a:r>
-          </a:p>
-          <a:p>
-            <a:pPr marL="1083436" lvl="1" indent="-542925" defTabSz="627379">
-              <a:spcBef>
-                <a:spcPts val="3000"/>
-              </a:spcBef>
-              <a:defRPr sz="4104" b="0"/>
-            </a:pPr>
-            <a:r>
-              <a:t>Python: </a:t>
-            </a:r>
-            <a:r>
-              <a:rPr u="sng">
+            <a:r>
+              <a:rPr dirty="0"/>
+              <a:t>Find 3 interesting datasets.</a:t>
+            </a:r>
+          </a:p>
+          <a:p>
+            <a:pPr lvl="1"/>
+            <a:r>
+              <a:rPr dirty="0"/>
+              <a:t>I suggest looking at </a:t>
+            </a:r>
+            <a:r>
+              <a:rPr u="sng" dirty="0">
+                <a:solidFill>
+                  <a:srgbClr val="0000FF"/>
+                </a:solidFill>
+                <a:uFill>
+                  <a:solidFill>
+                    <a:srgbClr val="0000FF"/>
+                  </a:solidFill>
+                </a:uFill>
                 <a:hlinkClick r:id="rId2"/>
               </a:rPr>
-              <a:t>https://github.com/python/cpython</a:t>
-            </a:r>
-          </a:p>
-          <a:p>
-            <a:pPr marL="1083436" lvl="1" indent="-542925" defTabSz="627379">
-              <a:spcBef>
-                <a:spcPts val="3000"/>
-              </a:spcBef>
-              <a:defRPr sz="4104" b="0"/>
-            </a:pPr>
-            <a:r>
-              <a:t>Jupyter: </a:t>
-            </a:r>
-            <a:r>
-              <a:rPr u="sng">
-                <a:hlinkClick r:id="rId3"/>
-              </a:rPr>
-              <a:t>https://github.com/jupyter/</a:t>
-            </a:r>
-          </a:p>
-          <a:p>
-            <a:pPr marL="1083436" lvl="1" indent="-542925" defTabSz="627379">
-              <a:spcBef>
-                <a:spcPts val="3000"/>
-              </a:spcBef>
-              <a:defRPr sz="4104" b="0"/>
-            </a:pPr>
-            <a:r>
-              <a:t>COGS 108: </a:t>
-            </a:r>
-            <a:r>
-              <a:rPr u="sng">
-                <a:hlinkClick r:id="rId4"/>
-              </a:rPr>
-              <a:t>https://github.com/COGS108/</a:t>
-            </a:r>
-          </a:p>
-          <a:p>
-            <a:pPr marL="542924" indent="-542924" defTabSz="627379">
-              <a:spcBef>
-                <a:spcPts val="3000"/>
-              </a:spcBef>
-              <a:defRPr sz="4104"/>
-            </a:pPr>
-            <a:r>
-              <a:t>Backup</a:t>
-            </a:r>
-          </a:p>
-          <a:p>
-            <a:pPr marL="542924" indent="-542924" defTabSz="627379">
-              <a:spcBef>
-                <a:spcPts val="3000"/>
-              </a:spcBef>
-              <a:defRPr sz="4104"/>
-            </a:pPr>
-            <a:r>
-              <a:t>Version control </a:t>
-            </a:r>
-            <a:r>
-              <a:rPr b="0"/>
-              <a:t>(</a:t>
-            </a:r>
-            <a:r>
-              <a:rPr b="0" i="1"/>
-              <a:t>undo</a:t>
-            </a:r>
-            <a:r>
-              <a:rPr b="0"/>
-              <a:t> on a large scale)</a:t>
-            </a:r>
-          </a:p>
-          <a:p>
-            <a:pPr marL="542924" indent="-542924" defTabSz="627379">
-              <a:spcBef>
-                <a:spcPts val="3000"/>
-              </a:spcBef>
-              <a:defRPr sz="4104"/>
-            </a:pPr>
-            <a:r>
-              <a:t>Code reuse</a:t>
-            </a:r>
-          </a:p>
-          <a:p>
-            <a:pPr marL="542924" indent="-542924" defTabSz="627379">
-              <a:spcBef>
-                <a:spcPts val="3000"/>
-              </a:spcBef>
-              <a:defRPr sz="4104" b="0"/>
-            </a:pPr>
-            <a:r>
-              <a:t>It also allows you to </a:t>
-            </a:r>
-            <a:r>
-              <a:rPr b="1"/>
-              <a:t>create websites</a:t>
-            </a:r>
-            <a:r>
-              <a:t>, like this: </a:t>
-            </a:r>
-            <a:r>
-              <a:rPr u="sng">
-                <a:hlinkClick r:id="rId5"/>
-              </a:rPr>
-              <a:t>https://www.samlau.me</a:t>
-            </a:r>
-            <a:r>
-              <a:t>.</a:t>
+              <a:t>Data is Plural</a:t>
+            </a:r>
+            <a:r>
+              <a:rPr dirty="0"/>
+              <a:t>. </a:t>
+            </a:r>
+          </a:p>
+          <a:p>
+            <a:r>
+              <a:rPr dirty="0"/>
+              <a:t>Come up with 3 research questions for each dataset.</a:t>
+            </a:r>
+          </a:p>
+          <a:p>
+            <a:r>
+              <a:rPr dirty="0"/>
+              <a:t>Pick one.</a:t>
+            </a:r>
+          </a:p>
+          <a:p>
+            <a:r>
+              <a:rPr dirty="0"/>
+              <a:t>Why does this work? Quantity &gt; quality for brainstorming.</a:t>
             </a:r>
           </a:p>
         </p:txBody>
@@ -4056,7 +3384,7 @@
                                       <p:cBhvr>
                                         <p:cTn id="6" fill="hold"/>
                                         <p:tgtEl>
-                                          <p:spTgt spid="141">
+                                          <p:spTgt spid="129">
                                             <p:bg/>
                                           </p:spTgt>
                                         </p:tgtEl>
@@ -4084,7 +3412,7 @@
                                       <p:cBhvr>
                                         <p:cTn id="8" fill="hold"/>
                                         <p:tgtEl>
-                                          <p:spTgt spid="141">
+                                          <p:spTgt spid="129">
                                             <p:txEl>
                                               <p:pRg st="0" end="0"/>
                                             </p:txEl>
@@ -4104,23 +3432,14 @@
                             </p:childTnLst>
                           </p:cTn>
                         </p:par>
-                      </p:childTnLst>
-                    </p:cTn>
-                  </p:par>
-                  <p:par>
-                    <p:cTn id="9" fill="hold">
-                      <p:stCondLst>
-                        <p:cond delay="indefinite"/>
-                      </p:stCondLst>
-                      <p:childTnLst>
                         <p:par>
-                          <p:cTn id="10" fill="hold">
+                          <p:cTn id="9" fill="hold">
                             <p:stCondLst>
                               <p:cond delay="0"/>
                             </p:stCondLst>
                             <p:childTnLst>
                               <p:par>
-                                <p:cTn id="11" presetID="1" presetClass="entr" presetSubtype="0" fill="hold" grpId="1" nodeType="clickEffect">
+                                <p:cTn id="10" presetID="1" presetClass="entr" presetSubtype="0" fill="hold" grpId="1" nodeType="afterEffect">
                                   <p:stCondLst>
                                     <p:cond delay="0"/>
                                   </p:stCondLst>
@@ -4130,9 +3449,9 @@
                                   <p:childTnLst>
                                     <p:set>
                                       <p:cBhvr>
-                                        <p:cTn id="12" fill="hold"/>
+                                        <p:cTn id="11" fill="hold"/>
                                         <p:tgtEl>
-                                          <p:spTgt spid="141">
+                                          <p:spTgt spid="129">
                                             <p:txEl>
                                               <p:pRg st="1" end="1"/>
                                             </p:txEl>
@@ -4156,19 +3475,19 @@
                     </p:cTn>
                   </p:par>
                   <p:par>
-                    <p:cTn id="13" fill="hold">
+                    <p:cTn id="12" fill="hold">
                       <p:stCondLst>
                         <p:cond delay="indefinite"/>
                       </p:stCondLst>
                       <p:childTnLst>
                         <p:par>
-                          <p:cTn id="14" fill="hold">
+                          <p:cTn id="13" fill="hold">
                             <p:stCondLst>
                               <p:cond delay="0"/>
                             </p:stCondLst>
                             <p:childTnLst>
                               <p:par>
-                                <p:cTn id="15" presetID="1" presetClass="entr" presetSubtype="0" fill="hold" grpId="1" nodeType="clickEffect">
+                                <p:cTn id="14" presetID="1" presetClass="entr" presetSubtype="0" fill="hold" grpId="1" nodeType="clickEffect">
                                   <p:stCondLst>
                                     <p:cond delay="0"/>
                                   </p:stCondLst>
@@ -4178,9 +3497,9 @@
                                   <p:childTnLst>
                                     <p:set>
                                       <p:cBhvr>
-                                        <p:cTn id="16" fill="hold"/>
+                                        <p:cTn id="15" fill="hold"/>
                                         <p:tgtEl>
-                                          <p:spTgt spid="141">
+                                          <p:spTgt spid="129">
                                             <p:txEl>
                                               <p:pRg st="2" end="2"/>
                                             </p:txEl>
@@ -4204,19 +3523,19 @@
                     </p:cTn>
                   </p:par>
                   <p:par>
-                    <p:cTn id="17" fill="hold">
+                    <p:cTn id="16" fill="hold">
                       <p:stCondLst>
                         <p:cond delay="indefinite"/>
                       </p:stCondLst>
                       <p:childTnLst>
                         <p:par>
-                          <p:cTn id="18" fill="hold">
+                          <p:cTn id="17" fill="hold">
                             <p:stCondLst>
                               <p:cond delay="0"/>
                             </p:stCondLst>
                             <p:childTnLst>
                               <p:par>
-                                <p:cTn id="19" presetID="1" presetClass="entr" presetSubtype="0" fill="hold" grpId="1" nodeType="clickEffect">
+                                <p:cTn id="18" presetID="1" presetClass="entr" presetSubtype="0" fill="hold" grpId="1" nodeType="clickEffect">
                                   <p:stCondLst>
                                     <p:cond delay="0"/>
                                   </p:stCondLst>
@@ -4226,9 +3545,9 @@
                                   <p:childTnLst>
                                     <p:set>
                                       <p:cBhvr>
-                                        <p:cTn id="20" fill="hold"/>
+                                        <p:cTn id="19" fill="hold"/>
                                         <p:tgtEl>
-                                          <p:spTgt spid="141">
+                                          <p:spTgt spid="129">
                                             <p:txEl>
                                               <p:pRg st="3" end="3"/>
                                             </p:txEl>
@@ -4252,19 +3571,19 @@
                     </p:cTn>
                   </p:par>
                   <p:par>
-                    <p:cTn id="21" fill="hold">
+                    <p:cTn id="20" fill="hold">
                       <p:stCondLst>
                         <p:cond delay="indefinite"/>
                       </p:stCondLst>
                       <p:childTnLst>
                         <p:par>
-                          <p:cTn id="22" fill="hold">
+                          <p:cTn id="21" fill="hold">
                             <p:stCondLst>
                               <p:cond delay="0"/>
                             </p:stCondLst>
                             <p:childTnLst>
                               <p:par>
-                                <p:cTn id="23" presetID="1" presetClass="entr" presetSubtype="0" fill="hold" grpId="1" nodeType="clickEffect">
+                                <p:cTn id="22" presetID="1" presetClass="entr" presetSubtype="0" fill="hold" grpId="1" nodeType="clickEffect">
                                   <p:stCondLst>
                                     <p:cond delay="0"/>
                                   </p:stCondLst>
@@ -4274,584 +3593,9 @@
                                   <p:childTnLst>
                                     <p:set>
                                       <p:cBhvr>
-                                        <p:cTn id="24" fill="hold"/>
+                                        <p:cTn id="23" fill="hold"/>
                                         <p:tgtEl>
-                                          <p:spTgt spid="141">
-                                            <p:txEl>
-                                              <p:pRg st="4" end="4"/>
-                                            </p:txEl>
-                                          </p:spTgt>
-                                        </p:tgtEl>
-                                        <p:attrNameLst>
-                                          <p:attrName>style.visibility</p:attrName>
-                                        </p:attrNameLst>
-                                      </p:cBhvr>
-                                      <p:to>
-                                        <p:strVal val="visible"/>
-                                      </p:to>
-                                    </p:set>
-                                  </p:childTnLst>
-                                </p:cTn>
-                              </p:par>
-                            </p:childTnLst>
-                          </p:cTn>
-                        </p:par>
-                      </p:childTnLst>
-                    </p:cTn>
-                  </p:par>
-                  <p:par>
-                    <p:cTn id="25" fill="hold">
-                      <p:stCondLst>
-                        <p:cond delay="indefinite"/>
-                      </p:stCondLst>
-                      <p:childTnLst>
-                        <p:par>
-                          <p:cTn id="26" fill="hold">
-                            <p:stCondLst>
-                              <p:cond delay="0"/>
-                            </p:stCondLst>
-                            <p:childTnLst>
-                              <p:par>
-                                <p:cTn id="27" presetID="1" presetClass="entr" presetSubtype="0" fill="hold" grpId="1" nodeType="clickEffect">
-                                  <p:stCondLst>
-                                    <p:cond delay="0"/>
-                                  </p:stCondLst>
-                                  <p:iterate>
-                                    <p:tmAbs val="0"/>
-                                  </p:iterate>
-                                  <p:childTnLst>
-                                    <p:set>
-                                      <p:cBhvr>
-                                        <p:cTn id="28" fill="hold"/>
-                                        <p:tgtEl>
-                                          <p:spTgt spid="141">
-                                            <p:txEl>
-                                              <p:pRg st="5" end="5"/>
-                                            </p:txEl>
-                                          </p:spTgt>
-                                        </p:tgtEl>
-                                        <p:attrNameLst>
-                                          <p:attrName>style.visibility</p:attrName>
-                                        </p:attrNameLst>
-                                      </p:cBhvr>
-                                      <p:to>
-                                        <p:strVal val="visible"/>
-                                      </p:to>
-                                    </p:set>
-                                  </p:childTnLst>
-                                </p:cTn>
-                              </p:par>
-                            </p:childTnLst>
-                          </p:cTn>
-                        </p:par>
-                      </p:childTnLst>
-                    </p:cTn>
-                  </p:par>
-                  <p:par>
-                    <p:cTn id="29" fill="hold">
-                      <p:stCondLst>
-                        <p:cond delay="indefinite"/>
-                      </p:stCondLst>
-                      <p:childTnLst>
-                        <p:par>
-                          <p:cTn id="30" fill="hold">
-                            <p:stCondLst>
-                              <p:cond delay="0"/>
-                            </p:stCondLst>
-                            <p:childTnLst>
-                              <p:par>
-                                <p:cTn id="31" presetID="1" presetClass="entr" presetSubtype="0" fill="hold" grpId="1" nodeType="clickEffect">
-                                  <p:stCondLst>
-                                    <p:cond delay="0"/>
-                                  </p:stCondLst>
-                                  <p:iterate>
-                                    <p:tmAbs val="0"/>
-                                  </p:iterate>
-                                  <p:childTnLst>
-                                    <p:set>
-                                      <p:cBhvr>
-                                        <p:cTn id="32" fill="hold"/>
-                                        <p:tgtEl>
-                                          <p:spTgt spid="141">
-                                            <p:txEl>
-                                              <p:pRg st="6" end="6"/>
-                                            </p:txEl>
-                                          </p:spTgt>
-                                        </p:tgtEl>
-                                        <p:attrNameLst>
-                                          <p:attrName>style.visibility</p:attrName>
-                                        </p:attrNameLst>
-                                      </p:cBhvr>
-                                      <p:to>
-                                        <p:strVal val="visible"/>
-                                      </p:to>
-                                    </p:set>
-                                  </p:childTnLst>
-                                </p:cTn>
-                              </p:par>
-                            </p:childTnLst>
-                          </p:cTn>
-                        </p:par>
-                      </p:childTnLst>
-                    </p:cTn>
-                  </p:par>
-                  <p:par>
-                    <p:cTn id="33" fill="hold">
-                      <p:stCondLst>
-                        <p:cond delay="indefinite"/>
-                      </p:stCondLst>
-                      <p:childTnLst>
-                        <p:par>
-                          <p:cTn id="34" fill="hold">
-                            <p:stCondLst>
-                              <p:cond delay="0"/>
-                            </p:stCondLst>
-                            <p:childTnLst>
-                              <p:par>
-                                <p:cTn id="35" presetID="1" presetClass="entr" presetSubtype="0" fill="hold" grpId="1" nodeType="clickEffect">
-                                  <p:stCondLst>
-                                    <p:cond delay="0"/>
-                                  </p:stCondLst>
-                                  <p:iterate>
-                                    <p:tmAbs val="0"/>
-                                  </p:iterate>
-                                  <p:childTnLst>
-                                    <p:set>
-                                      <p:cBhvr>
-                                        <p:cTn id="36" fill="hold"/>
-                                        <p:tgtEl>
-                                          <p:spTgt spid="141">
-                                            <p:txEl>
-                                              <p:pRg st="7" end="7"/>
-                                            </p:txEl>
-                                          </p:spTgt>
-                                        </p:tgtEl>
-                                        <p:attrNameLst>
-                                          <p:attrName>style.visibility</p:attrName>
-                                        </p:attrNameLst>
-                                      </p:cBhvr>
-                                      <p:to>
-                                        <p:strVal val="visible"/>
-                                      </p:to>
-                                    </p:set>
-                                  </p:childTnLst>
-                                </p:cTn>
-                              </p:par>
-                            </p:childTnLst>
-                          </p:cTn>
-                        </p:par>
-                      </p:childTnLst>
-                    </p:cTn>
-                  </p:par>
-                </p:childTnLst>
-              </p:cTn>
-              <p:prevCondLst>
-                <p:cond evt="onPrev" delay="0">
-                  <p:tgtEl>
-                    <p:sldTgt/>
-                  </p:tgtEl>
-                </p:cond>
-              </p:prevCondLst>
-              <p:nextCondLst>
-                <p:cond evt="onNext" delay="0">
-                  <p:tgtEl>
-                    <p:sldTgt/>
-                  </p:tgtEl>
-                </p:cond>
-              </p:nextCondLst>
-            </p:seq>
-          </p:childTnLst>
-        </p:cTn>
-      </p:par>
-    </p:tnLst>
-    <p:bldLst>
-      <p:bldP spid="141" grpId="1" build="p" bldLvl="5" animBg="1" advAuto="0"/>
-    </p:bldLst>
-  </p:timing>
-</p:sld>
-</file>
-
-<file path=ppt/slides/slide4.xml><?xml version="1.0" encoding="utf-8"?>
-<p:sld xmlns:a="http://schemas.openxmlformats.org/drawingml/2006/main" xmlns:r="http://schemas.openxmlformats.org/officeDocument/2006/relationships" xmlns:p="http://schemas.openxmlformats.org/presentationml/2006/main">
-  <p:cSld>
-    <p:spTree>
-      <p:nvGrpSpPr>
-        <p:cNvPr id="1" name=""/>
-        <p:cNvGrpSpPr/>
-        <p:nvPr/>
-      </p:nvGrpSpPr>
-      <p:grpSpPr>
-        <a:xfrm>
-          <a:off x="0" y="0"/>
-          <a:ext cx="0" cy="0"/>
-          <a:chOff x="0" y="0"/>
-          <a:chExt cx="0" cy="0"/>
-        </a:xfrm>
-      </p:grpSpPr>
-      <p:sp>
-        <p:nvSpPr>
-          <p:cNvPr id="146" name="Checking your work for Part 1"/>
-          <p:cNvSpPr txBox="1">
-            <a:spLocks noGrp="1"/>
-          </p:cNvSpPr>
-          <p:nvPr>
-            <p:ph type="title"/>
-          </p:nvPr>
-        </p:nvSpPr>
-        <p:spPr>
-          <a:prstGeom prst="rect">
-            <a:avLst/>
-          </a:prstGeom>
-        </p:spPr>
-        <p:txBody>
-          <a:bodyPr/>
-          <a:lstStyle/>
-          <a:p>
-            <a:r>
-              <a:t>Checking your work for Part 1</a:t>
-            </a:r>
-          </a:p>
-        </p:txBody>
-      </p:sp>
-      <p:sp>
-        <p:nvSpPr>
-          <p:cNvPr id="147" name="Check that your COGS108_Repo has a README and a .gitignore file. (Repo must be on your account.)…"/>
-          <p:cNvSpPr txBox="1">
-            <a:spLocks noGrp="1"/>
-          </p:cNvSpPr>
-          <p:nvPr>
-            <p:ph type="body" idx="1"/>
-          </p:nvPr>
-        </p:nvSpPr>
-        <p:spPr>
-          <a:xfrm>
-            <a:off x="1689100" y="2641600"/>
-            <a:ext cx="20382575" cy="9804400"/>
-          </a:xfrm>
-          <a:prstGeom prst="rect">
-            <a:avLst/>
-          </a:prstGeom>
-        </p:spPr>
-        <p:txBody>
-          <a:bodyPr/>
-          <a:lstStyle/>
-          <a:p>
-            <a:pPr marL="889000" indent="-685800">
-              <a:spcBef>
-                <a:spcPts val="2700"/>
-              </a:spcBef>
-              <a:defRPr b="0"/>
-            </a:pPr>
-            <a:r>
-              <a:t>Check that your COGS108_Repo has a README and a .gitignore file. (Repo must be on your account.)</a:t>
-            </a:r>
-          </a:p>
-          <a:p>
-            <a:pPr marL="889000" indent="-685800">
-              <a:spcBef>
-                <a:spcPts val="2700"/>
-              </a:spcBef>
-              <a:defRPr b="0"/>
-            </a:pPr>
-            <a:r>
-              <a:t>Go to COGS108/MyFirstPullRequest, click Pull requests.</a:t>
-            </a:r>
-          </a:p>
-          <a:p>
-            <a:pPr marL="1349375" lvl="1">
-              <a:spcBef>
-                <a:spcPts val="2700"/>
-              </a:spcBef>
-              <a:defRPr b="0"/>
-            </a:pPr>
-            <a:r>
-              <a:t>Make sure your PR shows up in that list.</a:t>
-            </a:r>
-          </a:p>
-          <a:p>
-            <a:pPr marL="1349375" lvl="1">
-              <a:spcBef>
-                <a:spcPts val="2700"/>
-              </a:spcBef>
-              <a:defRPr b="0"/>
-            </a:pPr>
-            <a:r>
-              <a:t>Make sure your PR has the right title.</a:t>
-            </a:r>
-          </a:p>
-          <a:p>
-            <a:pPr marL="1349375" lvl="1">
-              <a:spcBef>
-                <a:spcPts val="2700"/>
-              </a:spcBef>
-              <a:defRPr b="0"/>
-            </a:pPr>
-            <a:r>
-              <a:t>Make sure your PR has the right file.</a:t>
-            </a:r>
-          </a:p>
-        </p:txBody>
-      </p:sp>
-    </p:spTree>
-  </p:cSld>
-  <p:clrMapOvr>
-    <a:masterClrMapping/>
-  </p:clrMapOvr>
-  <p:transition spd="med"/>
-  <p:timing>
-    <p:tnLst>
-      <p:par>
-        <p:cTn id="1" dur="indefinite" restart="never" fill="hold" nodeType="tmRoot">
-          <p:childTnLst>
-            <p:seq concurrent="1" prevAc="none" nextAc="seek">
-              <p:cTn id="2" dur="indefinite" fill="hold" nodeType="mainSeq">
-                <p:childTnLst>
-                  <p:par>
-                    <p:cTn id="3" fill="hold">
-                      <p:stCondLst>
-                        <p:cond delay="indefinite"/>
-                      </p:stCondLst>
-                      <p:childTnLst>
-                        <p:par>
-                          <p:cTn id="4" fill="hold">
-                            <p:stCondLst>
-                              <p:cond delay="0"/>
-                            </p:stCondLst>
-                            <p:childTnLst>
-                              <p:par>
-                                <p:cTn id="5" presetID="1" presetClass="entr" presetSubtype="0" fill="hold" grpId="1" nodeType="clickEffect">
-                                  <p:stCondLst>
-                                    <p:cond delay="0"/>
-                                  </p:stCondLst>
-                                  <p:iterate>
-                                    <p:tmAbs val="0"/>
-                                  </p:iterate>
-                                  <p:childTnLst>
-                                    <p:set>
-                                      <p:cBhvr>
-                                        <p:cTn id="6" fill="hold"/>
-                                        <p:tgtEl>
-                                          <p:spTgt spid="147">
-                                            <p:bg/>
-                                          </p:spTgt>
-                                        </p:tgtEl>
-                                        <p:attrNameLst>
-                                          <p:attrName>style.visibility</p:attrName>
-                                        </p:attrNameLst>
-                                      </p:cBhvr>
-                                      <p:to>
-                                        <p:strVal val="visible"/>
-                                      </p:to>
-                                    </p:set>
-                                  </p:childTnLst>
-                                </p:cTn>
-                              </p:par>
-                              <p:par>
-                                <p:cTn id="7" presetID="1" presetClass="entr" presetSubtype="0" fill="hold" grpId="1" nodeType="withEffect">
-                                  <p:stCondLst>
-                                    <p:cond delay="0"/>
-                                  </p:stCondLst>
-                                  <p:iterate>
-                                    <p:tmAbs val="0"/>
-                                  </p:iterate>
-                                  <p:childTnLst>
-                                    <p:set>
-                                      <p:cBhvr>
-                                        <p:cTn id="8" fill="hold"/>
-                                        <p:tgtEl>
-                                          <p:spTgt spid="147">
-                                            <p:txEl>
-                                              <p:pRg st="0" end="0"/>
-                                            </p:txEl>
-                                          </p:spTgt>
-                                        </p:tgtEl>
-                                        <p:attrNameLst>
-                                          <p:attrName>style.visibility</p:attrName>
-                                        </p:attrNameLst>
-                                      </p:cBhvr>
-                                      <p:to>
-                                        <p:strVal val="visible"/>
-                                      </p:to>
-                                    </p:set>
-                                  </p:childTnLst>
-                                </p:cTn>
-                              </p:par>
-                            </p:childTnLst>
-                          </p:cTn>
-                        </p:par>
-                      </p:childTnLst>
-                    </p:cTn>
-                  </p:par>
-                  <p:par>
-                    <p:cTn id="9" fill="hold">
-                      <p:stCondLst>
-                        <p:cond delay="indefinite"/>
-                      </p:stCondLst>
-                      <p:childTnLst>
-                        <p:par>
-                          <p:cTn id="10" fill="hold">
-                            <p:stCondLst>
-                              <p:cond delay="0"/>
-                            </p:stCondLst>
-                            <p:childTnLst>
-                              <p:par>
-                                <p:cTn id="11" presetID="1" presetClass="entr" presetSubtype="0" fill="hold" grpId="1" nodeType="clickEffect">
-                                  <p:stCondLst>
-                                    <p:cond delay="0"/>
-                                  </p:stCondLst>
-                                  <p:iterate>
-                                    <p:tmAbs val="0"/>
-                                  </p:iterate>
-                                  <p:childTnLst>
-                                    <p:set>
-                                      <p:cBhvr>
-                                        <p:cTn id="12" fill="hold"/>
-                                        <p:tgtEl>
-                                          <p:spTgt spid="147">
-                                            <p:txEl>
-                                              <p:pRg st="1" end="1"/>
-                                            </p:txEl>
-                                          </p:spTgt>
-                                        </p:tgtEl>
-                                        <p:attrNameLst>
-                                          <p:attrName>style.visibility</p:attrName>
-                                        </p:attrNameLst>
-                                      </p:cBhvr>
-                                      <p:to>
-                                        <p:strVal val="visible"/>
-                                      </p:to>
-                                    </p:set>
-                                  </p:childTnLst>
-                                </p:cTn>
-                              </p:par>
-                            </p:childTnLst>
-                          </p:cTn>
-                        </p:par>
-                      </p:childTnLst>
-                    </p:cTn>
-                  </p:par>
-                  <p:par>
-                    <p:cTn id="13" fill="hold">
-                      <p:stCondLst>
-                        <p:cond delay="indefinite"/>
-                      </p:stCondLst>
-                      <p:childTnLst>
-                        <p:par>
-                          <p:cTn id="14" fill="hold">
-                            <p:stCondLst>
-                              <p:cond delay="0"/>
-                            </p:stCondLst>
-                            <p:childTnLst>
-                              <p:par>
-                                <p:cTn id="15" presetID="1" presetClass="entr" presetSubtype="0" fill="hold" grpId="1" nodeType="clickEffect">
-                                  <p:stCondLst>
-                                    <p:cond delay="0"/>
-                                  </p:stCondLst>
-                                  <p:iterate>
-                                    <p:tmAbs val="0"/>
-                                  </p:iterate>
-                                  <p:childTnLst>
-                                    <p:set>
-                                      <p:cBhvr>
-                                        <p:cTn id="16" fill="hold"/>
-                                        <p:tgtEl>
-                                          <p:spTgt spid="147">
-                                            <p:txEl>
-                                              <p:pRg st="2" end="2"/>
-                                            </p:txEl>
-                                          </p:spTgt>
-                                        </p:tgtEl>
-                                        <p:attrNameLst>
-                                          <p:attrName>style.visibility</p:attrName>
-                                        </p:attrNameLst>
-                                      </p:cBhvr>
-                                      <p:to>
-                                        <p:strVal val="visible"/>
-                                      </p:to>
-                                    </p:set>
-                                  </p:childTnLst>
-                                </p:cTn>
-                              </p:par>
-                            </p:childTnLst>
-                          </p:cTn>
-                        </p:par>
-                      </p:childTnLst>
-                    </p:cTn>
-                  </p:par>
-                  <p:par>
-                    <p:cTn id="17" fill="hold">
-                      <p:stCondLst>
-                        <p:cond delay="indefinite"/>
-                      </p:stCondLst>
-                      <p:childTnLst>
-                        <p:par>
-                          <p:cTn id="18" fill="hold">
-                            <p:stCondLst>
-                              <p:cond delay="0"/>
-                            </p:stCondLst>
-                            <p:childTnLst>
-                              <p:par>
-                                <p:cTn id="19" presetID="1" presetClass="entr" presetSubtype="0" fill="hold" grpId="1" nodeType="clickEffect">
-                                  <p:stCondLst>
-                                    <p:cond delay="0"/>
-                                  </p:stCondLst>
-                                  <p:iterate>
-                                    <p:tmAbs val="0"/>
-                                  </p:iterate>
-                                  <p:childTnLst>
-                                    <p:set>
-                                      <p:cBhvr>
-                                        <p:cTn id="20" fill="hold"/>
-                                        <p:tgtEl>
-                                          <p:spTgt spid="147">
-                                            <p:txEl>
-                                              <p:pRg st="3" end="3"/>
-                                            </p:txEl>
-                                          </p:spTgt>
-                                        </p:tgtEl>
-                                        <p:attrNameLst>
-                                          <p:attrName>style.visibility</p:attrName>
-                                        </p:attrNameLst>
-                                      </p:cBhvr>
-                                      <p:to>
-                                        <p:strVal val="visible"/>
-                                      </p:to>
-                                    </p:set>
-                                  </p:childTnLst>
-                                </p:cTn>
-                              </p:par>
-                            </p:childTnLst>
-                          </p:cTn>
-                        </p:par>
-                      </p:childTnLst>
-                    </p:cTn>
-                  </p:par>
-                  <p:par>
-                    <p:cTn id="21" fill="hold">
-                      <p:stCondLst>
-                        <p:cond delay="indefinite"/>
-                      </p:stCondLst>
-                      <p:childTnLst>
-                        <p:par>
-                          <p:cTn id="22" fill="hold">
-                            <p:stCondLst>
-                              <p:cond delay="0"/>
-                            </p:stCondLst>
-                            <p:childTnLst>
-                              <p:par>
-                                <p:cTn id="23" presetID="1" presetClass="entr" presetSubtype="0" fill="hold" grpId="1" nodeType="clickEffect">
-                                  <p:stCondLst>
-                                    <p:cond delay="0"/>
-                                  </p:stCondLst>
-                                  <p:iterate>
-                                    <p:tmAbs val="0"/>
-                                  </p:iterate>
-                                  <p:childTnLst>
-                                    <p:set>
-                                      <p:cBhvr>
-                                        <p:cTn id="24" fill="hold"/>
-                                        <p:tgtEl>
-                                          <p:spTgt spid="147">
+                                          <p:spTgt spid="129">
                                             <p:txEl>
                                               <p:pRg st="4" end="4"/>
                                             </p:txEl>
@@ -4896,13 +3640,13 @@
       </p:par>
     </p:tnLst>
     <p:bldLst>
-      <p:bldP spid="147" grpId="1" build="p" bldLvl="5" animBg="1" advAuto="0"/>
+      <p:bldP spid="129" grpId="1" build="p" bldLvl="5" animBg="1" advAuto="0"/>
     </p:bldLst>
   </p:timing>
 </p:sld>
 </file>
 
-<file path=ppt/slides/slide5.xml><?xml version="1.0" encoding="utf-8"?>
+<file path=ppt/slides/slide3.xml><?xml version="1.0" encoding="utf-8"?>
 <p:sld xmlns:a="http://schemas.openxmlformats.org/drawingml/2006/main" xmlns:r="http://schemas.openxmlformats.org/officeDocument/2006/relationships" xmlns:p="http://schemas.openxmlformats.org/presentationml/2006/main">
   <p:cSld>
     <p:spTree>
@@ -4921,7 +3665,7 @@
       </p:grpSpPr>
       <p:sp>
         <p:nvSpPr>
-          <p:cNvPr id="155" name="How to google for python help"/>
+          <p:cNvPr id="131" name="How do I pick a question?"/>
           <p:cNvSpPr txBox="1">
             <a:spLocks noGrp="1"/>
           </p:cNvSpPr>
@@ -4936,21 +3680,17 @@
         </p:spPr>
         <p:txBody>
           <a:bodyPr/>
-          <a:lstStyle>
-            <a:lvl1pPr defTabSz="800735">
-              <a:defRPr sz="10864"/>
-            </a:lvl1pPr>
-          </a:lstStyle>
-          <a:p>
-            <a:r>
-              <a:t>How to google for python help</a:t>
+          <a:lstStyle/>
+          <a:p>
+            <a:r>
+              <a:t>How do I pick a question?</a:t>
             </a:r>
           </a:p>
         </p:txBody>
       </p:sp>
       <p:sp>
         <p:nvSpPr>
-          <p:cNvPr id="156" name="People have done ~everything in python, and it’s all online. Finding it is the tricky part…"/>
+          <p:cNvPr id="132" name="Ask a question that would be interesting to a friend.…"/>
           <p:cNvSpPr txBox="1">
             <a:spLocks noGrp="1"/>
           </p:cNvSpPr>
@@ -4967,171 +3707,75 @@
           <a:bodyPr/>
           <a:lstStyle/>
           <a:p>
-            <a:pPr>
-              <a:defRPr b="0"/>
+            <a:pPr marL="650081" indent="-650081" defTabSz="751205">
+              <a:spcBef>
+                <a:spcPts val="3600"/>
+              </a:spcBef>
+              <a:defRPr sz="4900"/>
             </a:pPr>
             <a:r>
               <a:rPr dirty="0"/>
-              <a:t>People have done ~everything in python, and it’s all online. Finding it is the tricky part</a:t>
-            </a:r>
-          </a:p>
-          <a:p>
-            <a:pPr>
-              <a:defRPr b="0"/>
+              <a:t>Ask a question that would be interesting to a friend.</a:t>
+            </a:r>
+          </a:p>
+          <a:p>
+            <a:pPr marL="650081" indent="-650081" defTabSz="751205">
+              <a:spcBef>
+                <a:spcPts val="3600"/>
+              </a:spcBef>
+              <a:defRPr sz="4900"/>
             </a:pPr>
             <a:r>
               <a:rPr dirty="0"/>
-              <a:t>Find code snippets that do roughly what you want</a:t>
-            </a:r>
-          </a:p>
-          <a:p>
-            <a:pPr lvl="1">
-              <a:defRPr b="0"/>
+              <a:t>Many good questions relate two quantities that are not obviously related.</a:t>
+            </a:r>
+          </a:p>
+          <a:p>
+            <a:pPr marL="1297273" lvl="1" indent="-650081" defTabSz="751205">
+              <a:spcBef>
+                <a:spcPts val="3600"/>
+              </a:spcBef>
+              <a:defRPr sz="4900"/>
             </a:pPr>
             <a:r>
               <a:rPr dirty="0"/>
-              <a:t>Pick out the useful patterns/syntax and </a:t>
-            </a:r>
-            <a:r>
-              <a:rPr b="1" dirty="0"/>
-              <a:t>write your own code</a:t>
-            </a:r>
-          </a:p>
-        </p:txBody>
-      </p:sp>
-    </p:spTree>
-  </p:cSld>
-  <p:clrMapOvr>
-    <a:masterClrMapping/>
-  </p:clrMapOvr>
-  <p:transition spd="med"/>
-</p:sld>
-</file>
-
-<file path=ppt/slides/slide6.xml><?xml version="1.0" encoding="utf-8"?>
-<p:sld xmlns:a="http://schemas.openxmlformats.org/drawingml/2006/main" xmlns:r="http://schemas.openxmlformats.org/officeDocument/2006/relationships" xmlns:p="http://schemas.openxmlformats.org/presentationml/2006/main">
-  <p:cSld>
-    <p:spTree>
-      <p:nvGrpSpPr>
-        <p:cNvPr id="1" name=""/>
-        <p:cNvGrpSpPr/>
-        <p:nvPr/>
-      </p:nvGrpSpPr>
-      <p:grpSpPr>
-        <a:xfrm>
-          <a:off x="0" y="0"/>
-          <a:ext cx="0" cy="0"/>
-          <a:chOff x="0" y="0"/>
-          <a:chExt cx="0" cy="0"/>
-        </a:xfrm>
-      </p:grpSpPr>
-      <p:sp>
-        <p:nvSpPr>
-          <p:cNvPr id="158" name="Your Turn: Work on A1"/>
-          <p:cNvSpPr txBox="1">
-            <a:spLocks noGrp="1"/>
-          </p:cNvSpPr>
-          <p:nvPr>
-            <p:ph type="title"/>
-          </p:nvPr>
-        </p:nvSpPr>
-        <p:spPr>
-          <a:prstGeom prst="rect">
-            <a:avLst/>
-          </a:prstGeom>
-        </p:spPr>
-        <p:txBody>
-          <a:bodyPr/>
-          <a:lstStyle/>
-          <a:p>
-            <a:r>
-              <a:t>Your Turn: Work on A1</a:t>
-            </a:r>
-          </a:p>
-        </p:txBody>
-      </p:sp>
-    </p:spTree>
-  </p:cSld>
-  <p:clrMapOvr>
-    <a:masterClrMapping/>
-  </p:clrMapOvr>
-  <p:transition spd="med"/>
-</p:sld>
-</file>
-
-<file path=ppt/slides/slide7.xml><?xml version="1.0" encoding="utf-8"?>
-<p:sld xmlns:a="http://schemas.openxmlformats.org/drawingml/2006/main" xmlns:r="http://schemas.openxmlformats.org/officeDocument/2006/relationships" xmlns:p="http://schemas.openxmlformats.org/presentationml/2006/main">
-  <p:cSld>
-    <p:spTree>
-      <p:nvGrpSpPr>
-        <p:cNvPr id="1" name=""/>
-        <p:cNvGrpSpPr/>
-        <p:nvPr/>
-      </p:nvGrpSpPr>
-      <p:grpSpPr>
-        <a:xfrm>
-          <a:off x="0" y="0"/>
-          <a:ext cx="0" cy="0"/>
-          <a:chOff x="0" y="0"/>
-          <a:chExt cx="0" cy="0"/>
-        </a:xfrm>
-      </p:grpSpPr>
-      <p:sp>
-        <p:nvSpPr>
-          <p:cNvPr id="143" name="Part 1 Walkthrough"/>
-          <p:cNvSpPr txBox="1">
-            <a:spLocks noGrp="1"/>
-          </p:cNvSpPr>
-          <p:nvPr>
-            <p:ph type="title"/>
-          </p:nvPr>
-        </p:nvSpPr>
-        <p:spPr>
-          <a:prstGeom prst="rect">
-            <a:avLst/>
-          </a:prstGeom>
-        </p:spPr>
-        <p:txBody>
-          <a:bodyPr/>
-          <a:lstStyle/>
-          <a:p>
-            <a:r>
-              <a:t>Part 1 Walkthrough</a:t>
-            </a:r>
-          </a:p>
-        </p:txBody>
-      </p:sp>
-      <p:sp>
-        <p:nvSpPr>
-          <p:cNvPr id="144" name="Complete walkthrough of Part 1 in 5 minutes.…"/>
-          <p:cNvSpPr txBox="1">
-            <a:spLocks noGrp="1"/>
-          </p:cNvSpPr>
-          <p:nvPr>
-            <p:ph type="body" idx="1"/>
-          </p:nvPr>
-        </p:nvSpPr>
-        <p:spPr>
-          <a:xfrm>
-            <a:off x="1689100" y="2641600"/>
-            <a:ext cx="20382575" cy="9804400"/>
-          </a:xfrm>
-          <a:prstGeom prst="rect">
-            <a:avLst/>
-          </a:prstGeom>
-        </p:spPr>
-        <p:txBody>
-          <a:bodyPr/>
-          <a:lstStyle/>
-          <a:p>
-            <a:pPr marL="889000" indent="-685800">
+              <a:t>Boring: What’s the most common name in COGS 108?</a:t>
+            </a:r>
+          </a:p>
+          <a:p>
+            <a:pPr marL="1297273" lvl="1" indent="-650081" defTabSz="751205">
               <a:spcBef>
-                <a:spcPts val="2700"/>
+                <a:spcPts val="3600"/>
               </a:spcBef>
+              <a:defRPr sz="4900"/>
             </a:pPr>
             <a:r>
               <a:rPr dirty="0"/>
-              <a:t>Complete walkthrough of Part 1 in 5 minutes. </a:t>
+              <a:t>Boring: Can you predict a person’s sex from their name?</a:t>
+            </a:r>
+          </a:p>
+          <a:p>
+            <a:pPr marL="1297273" lvl="1" indent="-650081" defTabSz="751205">
+              <a:spcBef>
+                <a:spcPts val="3600"/>
+              </a:spcBef>
+              <a:defRPr sz="4900"/>
+            </a:pPr>
+            <a:r>
+              <a:rPr dirty="0"/>
+              <a:t>Fun: Can you predict a person’s age from their name?</a:t>
+            </a:r>
+          </a:p>
+          <a:p>
+            <a:pPr marL="1297273" lvl="1" indent="-650081" defTabSz="751205">
+              <a:spcBef>
+                <a:spcPts val="3600"/>
+              </a:spcBef>
+              <a:defRPr sz="4900"/>
+            </a:pPr>
+            <a:r>
+              <a:rPr dirty="0"/>
+              <a:t>Fun: Can you predict a person’s sex from the last letter of their name?</a:t>
             </a:r>
           </a:p>
         </p:txBody>
@@ -5175,7 +3819,7 @@
                                       <p:cBhvr>
                                         <p:cTn id="6" fill="hold"/>
                                         <p:tgtEl>
-                                          <p:spTgt spid="144">
+                                          <p:spTgt spid="132">
                                             <p:bg/>
                                           </p:spTgt>
                                         </p:tgtEl>
@@ -5203,7 +3847,7 @@
                                       <p:cBhvr>
                                         <p:cTn id="8" fill="hold"/>
                                         <p:tgtEl>
-                                          <p:spTgt spid="144">
+                                          <p:spTgt spid="132">
                                             <p:txEl>
                                               <p:pRg st="0" end="0"/>
                                             </p:txEl>
@@ -5223,225 +3867,14 @@
                             </p:childTnLst>
                           </p:cTn>
                         </p:par>
-                      </p:childTnLst>
-                    </p:cTn>
-                  </p:par>
-                </p:childTnLst>
-              </p:cTn>
-              <p:prevCondLst>
-                <p:cond evt="onPrev" delay="0">
-                  <p:tgtEl>
-                    <p:sldTgt/>
-                  </p:tgtEl>
-                </p:cond>
-              </p:prevCondLst>
-              <p:nextCondLst>
-                <p:cond evt="onNext" delay="0">
-                  <p:tgtEl>
-                    <p:sldTgt/>
-                  </p:tgtEl>
-                </p:cond>
-              </p:nextCondLst>
-            </p:seq>
-          </p:childTnLst>
-        </p:cTn>
-      </p:par>
-    </p:tnLst>
-    <p:bldLst>
-      <p:bldP spid="144" grpId="1" build="p" bldLvl="5" animBg="1" advAuto="0"/>
-    </p:bldLst>
-  </p:timing>
-</p:sld>
-</file>
-
-<file path=ppt/slides/slide8.xml><?xml version="1.0" encoding="utf-8"?>
-<p:sld xmlns:a="http://schemas.openxmlformats.org/drawingml/2006/main" xmlns:r="http://schemas.openxmlformats.org/officeDocument/2006/relationships" xmlns:p="http://schemas.openxmlformats.org/presentationml/2006/main">
-  <p:cSld>
-    <p:spTree>
-      <p:nvGrpSpPr>
-        <p:cNvPr id="1" name=""/>
-        <p:cNvGrpSpPr/>
-        <p:nvPr/>
-      </p:nvGrpSpPr>
-      <p:grpSpPr>
-        <a:xfrm>
-          <a:off x="0" y="0"/>
-          <a:ext cx="0" cy="0"/>
-          <a:chOff x="0" y="0"/>
-          <a:chExt cx="0" cy="0"/>
-        </a:xfrm>
-      </p:grpSpPr>
-      <p:sp>
-        <p:nvSpPr>
-          <p:cNvPr id="152" name="Checking your work (in general on datahub)"/>
-          <p:cNvSpPr txBox="1">
-            <a:spLocks noGrp="1"/>
-          </p:cNvSpPr>
-          <p:nvPr>
-            <p:ph type="title"/>
-          </p:nvPr>
-        </p:nvSpPr>
-        <p:spPr>
-          <a:prstGeom prst="rect">
-            <a:avLst/>
-          </a:prstGeom>
-        </p:spPr>
-        <p:txBody>
-          <a:bodyPr/>
-          <a:lstStyle>
-            <a:lvl1pPr defTabSz="561340">
-              <a:defRPr sz="7616"/>
-            </a:lvl1pPr>
-          </a:lstStyle>
-          <a:p>
-            <a:r>
-              <a:t>Checking your work (in general on datahub)</a:t>
-            </a:r>
-          </a:p>
-        </p:txBody>
-      </p:sp>
-      <p:sp>
-        <p:nvSpPr>
-          <p:cNvPr id="153" name="The tests built into the notebook are (very) minimal.…"/>
-          <p:cNvSpPr txBox="1">
-            <a:spLocks noGrp="1"/>
-          </p:cNvSpPr>
-          <p:nvPr>
-            <p:ph type="body" idx="1"/>
-          </p:nvPr>
-        </p:nvSpPr>
-        <p:spPr>
-          <a:prstGeom prst="rect">
-            <a:avLst/>
-          </a:prstGeom>
-        </p:spPr>
-        <p:txBody>
-          <a:bodyPr/>
-          <a:lstStyle/>
-          <a:p>
-            <a:pPr marL="650081" indent="-650081" defTabSz="751205">
-              <a:spcBef>
-                <a:spcPts val="3600"/>
-              </a:spcBef>
-              <a:defRPr sz="4914" b="0"/>
-            </a:pPr>
-            <a:r>
-              <a:t>The tests built into the notebook are (very) minimal.</a:t>
-            </a:r>
-          </a:p>
-          <a:p>
-            <a:pPr marL="1297273" lvl="1" indent="-650081" defTabSz="751205">
-              <a:spcBef>
-                <a:spcPts val="3600"/>
-              </a:spcBef>
-              <a:defRPr sz="4914" b="0"/>
-            </a:pPr>
-            <a:r>
-              <a:t>To </a:t>
-            </a:r>
-            <a:r>
-              <a:rPr b="1"/>
-              <a:t>write your own tests</a:t>
-            </a:r>
-            <a:r>
-              <a:t>, add a cell with </a:t>
-            </a:r>
-            <a:r>
-              <a:rPr b="1"/>
-              <a:t>assert</a:t>
-            </a:r>
-            <a:r>
-              <a:t> statements below your code.</a:t>
-            </a:r>
-          </a:p>
-          <a:p>
-            <a:pPr marL="650081" indent="-650081" defTabSz="751205">
-              <a:spcBef>
-                <a:spcPts val="3600"/>
-              </a:spcBef>
-              <a:defRPr sz="4914" b="0"/>
-            </a:pPr>
-            <a:r>
-              <a:t>Make sure to </a:t>
-            </a:r>
-            <a:r>
-              <a:rPr b="1"/>
-              <a:t>click Validate before turning in your notebook</a:t>
-            </a:r>
-            <a:r>
-              <a:t>!</a:t>
-            </a:r>
-          </a:p>
-          <a:p>
-            <a:pPr marL="1297273" lvl="1" indent="-650081" defTabSz="751205">
-              <a:spcBef>
-                <a:spcPts val="3600"/>
-              </a:spcBef>
-              <a:defRPr sz="4914" b="0"/>
-            </a:pPr>
-            <a:r>
-              <a:t>This replicates what our autograder will do.</a:t>
-            </a:r>
-          </a:p>
-          <a:p>
-            <a:pPr marL="650081" indent="-650081" defTabSz="751205">
-              <a:spcBef>
-                <a:spcPts val="3600"/>
-              </a:spcBef>
-              <a:defRPr sz="4914" b="0"/>
-            </a:pPr>
-            <a:r>
-              <a:t>Make sure to click submit once you’re ready to submit.</a:t>
-            </a:r>
-          </a:p>
-          <a:p>
-            <a:pPr marL="1297273" lvl="1" indent="-650081" defTabSz="751205">
-              <a:spcBef>
-                <a:spcPts val="3600"/>
-              </a:spcBef>
-              <a:defRPr sz="4914" b="0"/>
-            </a:pPr>
-            <a:r>
-              <a:t>And </a:t>
-            </a:r>
-            <a:r>
-              <a:rPr b="1"/>
-              <a:t>don’t click submit after the deadline unless you mean to submit late</a:t>
-            </a:r>
-            <a:r>
-              <a:t>.</a:t>
-            </a:r>
-          </a:p>
-        </p:txBody>
-      </p:sp>
-    </p:spTree>
-  </p:cSld>
-  <p:clrMapOvr>
-    <a:masterClrMapping/>
-  </p:clrMapOvr>
-  <p:transition spd="med"/>
-  <p:timing>
-    <p:tnLst>
-      <p:par>
-        <p:cTn id="1" dur="indefinite" restart="never" fill="hold" nodeType="tmRoot">
-          <p:childTnLst>
-            <p:seq concurrent="1" prevAc="none" nextAc="seek">
-              <p:cTn id="2" dur="indefinite" fill="hold" nodeType="mainSeq">
-                <p:childTnLst>
-                  <p:par>
-                    <p:cTn id="3" fill="hold">
-                      <p:stCondLst>
-                        <p:cond delay="indefinite"/>
-                      </p:stCondLst>
-                      <p:childTnLst>
                         <p:par>
-                          <p:cTn id="4" fill="hold">
+                          <p:cTn id="9" fill="hold">
                             <p:stCondLst>
                               <p:cond delay="0"/>
                             </p:stCondLst>
                             <p:childTnLst>
                               <p:par>
-                                <p:cTn id="5" presetID="1" presetClass="entr" presetSubtype="0" fill="hold" grpId="1" nodeType="clickEffect">
+                                <p:cTn id="10" presetID="1" presetClass="entr" presetSubtype="0" fill="hold" grpId="1" nodeType="afterEffect">
                                   <p:stCondLst>
                                     <p:cond delay="0"/>
                                   </p:stCondLst>
@@ -5451,85 +3884,9 @@
                                   <p:childTnLst>
                                     <p:set>
                                       <p:cBhvr>
-                                        <p:cTn id="6" fill="hold"/>
+                                        <p:cTn id="11" fill="hold"/>
                                         <p:tgtEl>
-                                          <p:spTgt spid="153">
-                                            <p:bg/>
-                                          </p:spTgt>
-                                        </p:tgtEl>
-                                        <p:attrNameLst>
-                                          <p:attrName>style.visibility</p:attrName>
-                                        </p:attrNameLst>
-                                      </p:cBhvr>
-                                      <p:to>
-                                        <p:strVal val="visible"/>
-                                      </p:to>
-                                    </p:set>
-                                  </p:childTnLst>
-                                </p:cTn>
-                              </p:par>
-                              <p:par>
-                                <p:cTn id="7" presetID="1" presetClass="entr" presetSubtype="0" fill="hold" grpId="1" nodeType="withEffect">
-                                  <p:stCondLst>
-                                    <p:cond delay="0"/>
-                                  </p:stCondLst>
-                                  <p:iterate>
-                                    <p:tmAbs val="0"/>
-                                  </p:iterate>
-                                  <p:childTnLst>
-                                    <p:set>
-                                      <p:cBhvr>
-                                        <p:cTn id="8" fill="hold"/>
-                                        <p:tgtEl>
-                                          <p:spTgt spid="153">
-                                            <p:txEl>
-                                              <p:pRg st="0" end="0"/>
-                                            </p:txEl>
-                                          </p:spTgt>
-                                        </p:tgtEl>
-                                        <p:attrNameLst>
-                                          <p:attrName>style.visibility</p:attrName>
-                                        </p:attrNameLst>
-                                      </p:cBhvr>
-                                      <p:to>
-                                        <p:strVal val="visible"/>
-                                      </p:to>
-                                    </p:set>
-                                  </p:childTnLst>
-                                </p:cTn>
-                              </p:par>
-                            </p:childTnLst>
-                          </p:cTn>
-                        </p:par>
-                      </p:childTnLst>
-                    </p:cTn>
-                  </p:par>
-                  <p:par>
-                    <p:cTn id="9" fill="hold">
-                      <p:stCondLst>
-                        <p:cond delay="indefinite"/>
-                      </p:stCondLst>
-                      <p:childTnLst>
-                        <p:par>
-                          <p:cTn id="10" fill="hold">
-                            <p:stCondLst>
-                              <p:cond delay="0"/>
-                            </p:stCondLst>
-                            <p:childTnLst>
-                              <p:par>
-                                <p:cTn id="11" presetID="1" presetClass="entr" presetSubtype="0" fill="hold" grpId="1" nodeType="clickEffect">
-                                  <p:stCondLst>
-                                    <p:cond delay="0"/>
-                                  </p:stCondLst>
-                                  <p:iterate>
-                                    <p:tmAbs val="0"/>
-                                  </p:iterate>
-                                  <p:childTnLst>
-                                    <p:set>
-                                      <p:cBhvr>
-                                        <p:cTn id="12" fill="hold"/>
-                                        <p:tgtEl>
-                                          <p:spTgt spid="153">
+                                          <p:spTgt spid="132">
                                             <p:txEl>
                                               <p:pRg st="1" end="1"/>
                                             </p:txEl>
@@ -5553,19 +3910,19 @@
                     </p:cTn>
                   </p:par>
                   <p:par>
-                    <p:cTn id="13" fill="hold">
+                    <p:cTn id="12" fill="hold">
                       <p:stCondLst>
                         <p:cond delay="indefinite"/>
                       </p:stCondLst>
                       <p:childTnLst>
                         <p:par>
-                          <p:cTn id="14" fill="hold">
+                          <p:cTn id="13" fill="hold">
                             <p:stCondLst>
                               <p:cond delay="0"/>
                             </p:stCondLst>
                             <p:childTnLst>
                               <p:par>
-                                <p:cTn id="15" presetID="1" presetClass="entr" presetSubtype="0" fill="hold" grpId="1" nodeType="clickEffect">
+                                <p:cTn id="14" presetID="1" presetClass="entr" presetSubtype="0" fill="hold" grpId="1" nodeType="clickEffect">
                                   <p:stCondLst>
                                     <p:cond delay="0"/>
                                   </p:stCondLst>
@@ -5575,9 +3932,9 @@
                                   <p:childTnLst>
                                     <p:set>
                                       <p:cBhvr>
-                                        <p:cTn id="16" fill="hold"/>
+                                        <p:cTn id="15" fill="hold"/>
                                         <p:tgtEl>
-                                          <p:spTgt spid="153">
+                                          <p:spTgt spid="132">
                                             <p:txEl>
                                               <p:pRg st="2" end="2"/>
                                             </p:txEl>
@@ -5601,19 +3958,19 @@
                     </p:cTn>
                   </p:par>
                   <p:par>
-                    <p:cTn id="17" fill="hold">
+                    <p:cTn id="16" fill="hold">
                       <p:stCondLst>
                         <p:cond delay="indefinite"/>
                       </p:stCondLst>
                       <p:childTnLst>
                         <p:par>
-                          <p:cTn id="18" fill="hold">
+                          <p:cTn id="17" fill="hold">
                             <p:stCondLst>
                               <p:cond delay="0"/>
                             </p:stCondLst>
                             <p:childTnLst>
                               <p:par>
-                                <p:cTn id="19" presetID="1" presetClass="entr" presetSubtype="0" fill="hold" grpId="1" nodeType="clickEffect">
+                                <p:cTn id="18" presetID="1" presetClass="entr" presetSubtype="0" fill="hold" grpId="1" nodeType="clickEffect">
                                   <p:stCondLst>
                                     <p:cond delay="0"/>
                                   </p:stCondLst>
@@ -5623,9 +3980,9 @@
                                   <p:childTnLst>
                                     <p:set>
                                       <p:cBhvr>
-                                        <p:cTn id="20" fill="hold"/>
+                                        <p:cTn id="19" fill="hold"/>
                                         <p:tgtEl>
-                                          <p:spTgt spid="153">
+                                          <p:spTgt spid="132">
                                             <p:txEl>
                                               <p:pRg st="3" end="3"/>
                                             </p:txEl>
@@ -5649,19 +4006,19 @@
                     </p:cTn>
                   </p:par>
                   <p:par>
-                    <p:cTn id="21" fill="hold">
+                    <p:cTn id="20" fill="hold">
                       <p:stCondLst>
                         <p:cond delay="indefinite"/>
                       </p:stCondLst>
                       <p:childTnLst>
                         <p:par>
-                          <p:cTn id="22" fill="hold">
+                          <p:cTn id="21" fill="hold">
                             <p:stCondLst>
                               <p:cond delay="0"/>
                             </p:stCondLst>
                             <p:childTnLst>
                               <p:par>
-                                <p:cTn id="23" presetID="1" presetClass="entr" presetSubtype="0" fill="hold" grpId="1" nodeType="clickEffect">
+                                <p:cTn id="22" presetID="1" presetClass="entr" presetSubtype="0" fill="hold" grpId="1" nodeType="clickEffect">
                                   <p:stCondLst>
                                     <p:cond delay="0"/>
                                   </p:stCondLst>
@@ -5671,9 +4028,9 @@
                                   <p:childTnLst>
                                     <p:set>
                                       <p:cBhvr>
-                                        <p:cTn id="24" fill="hold"/>
+                                        <p:cTn id="23" fill="hold"/>
                                         <p:tgtEl>
-                                          <p:spTgt spid="153">
+                                          <p:spTgt spid="132">
                                             <p:txEl>
                                               <p:pRg st="4" end="4"/>
                                             </p:txEl>
@@ -5697,19 +4054,19 @@
                     </p:cTn>
                   </p:par>
                   <p:par>
-                    <p:cTn id="25" fill="hold">
+                    <p:cTn id="24" fill="hold">
                       <p:stCondLst>
                         <p:cond delay="indefinite"/>
                       </p:stCondLst>
                       <p:childTnLst>
                         <p:par>
-                          <p:cTn id="26" fill="hold">
+                          <p:cTn id="25" fill="hold">
                             <p:stCondLst>
                               <p:cond delay="0"/>
                             </p:stCondLst>
                             <p:childTnLst>
                               <p:par>
-                                <p:cTn id="27" presetID="1" presetClass="entr" presetSubtype="0" fill="hold" grpId="1" nodeType="clickEffect">
+                                <p:cTn id="26" presetID="1" presetClass="entr" presetSubtype="0" fill="hold" grpId="1" nodeType="clickEffect">
                                   <p:stCondLst>
                                     <p:cond delay="0"/>
                                   </p:stCondLst>
@@ -5719,9 +4076,9 @@
                                   <p:childTnLst>
                                     <p:set>
                                       <p:cBhvr>
-                                        <p:cTn id="28" fill="hold"/>
+                                        <p:cTn id="27" fill="hold"/>
                                         <p:tgtEl>
-                                          <p:spTgt spid="153">
+                                          <p:spTgt spid="132">
                                             <p:txEl>
                                               <p:pRg st="5" end="5"/>
                                             </p:txEl>
@@ -5766,9 +4123,659 @@
       </p:par>
     </p:tnLst>
     <p:bldLst>
-      <p:bldP spid="153" grpId="1" build="p" bldLvl="5" animBg="1" advAuto="0"/>
+      <p:bldP spid="132" grpId="1" build="p" bldLvl="5" animBg="1" advAuto="0"/>
     </p:bldLst>
   </p:timing>
+</p:sld>
+</file>
+
+<file path=ppt/slides/slide4.xml><?xml version="1.0" encoding="utf-8"?>
+<p:sld xmlns:a="http://schemas.openxmlformats.org/drawingml/2006/main" xmlns:r="http://schemas.openxmlformats.org/officeDocument/2006/relationships" xmlns:p="http://schemas.openxmlformats.org/presentationml/2006/main">
+  <p:cSld>
+    <p:spTree>
+      <p:nvGrpSpPr>
+        <p:cNvPr id="1" name=""/>
+        <p:cNvGrpSpPr/>
+        <p:nvPr/>
+      </p:nvGrpSpPr>
+      <p:grpSpPr>
+        <a:xfrm>
+          <a:off x="0" y="0"/>
+          <a:ext cx="0" cy="0"/>
+          <a:chOff x="0" y="0"/>
+          <a:chExt cx="0" cy="0"/>
+        </a:xfrm>
+      </p:grpSpPr>
+      <p:sp>
+        <p:nvSpPr>
+          <p:cNvPr id="134" name="Baby names demo:…"/>
+          <p:cNvSpPr txBox="1">
+            <a:spLocks noGrp="1"/>
+          </p:cNvSpPr>
+          <p:nvPr>
+            <p:ph type="title"/>
+          </p:nvPr>
+        </p:nvSpPr>
+        <p:spPr>
+          <a:xfrm>
+            <a:off x="1778000" y="3085729"/>
+            <a:ext cx="20828000" cy="7544543"/>
+          </a:xfrm>
+          <a:prstGeom prst="rect">
+            <a:avLst/>
+          </a:prstGeom>
+        </p:spPr>
+        <p:txBody>
+          <a:bodyPr/>
+          <a:lstStyle/>
+          <a:p>
+            <a:pPr defTabSz="553084">
+              <a:defRPr sz="7500"/>
+            </a:pPr>
+            <a:r>
+              <a:rPr dirty="0"/>
+              <a:t>Baby names demo:</a:t>
+            </a:r>
+          </a:p>
+          <a:p>
+            <a:pPr defTabSz="553084">
+              <a:defRPr sz="7500" u="sng"/>
+            </a:pPr>
+            <a:r>
+              <a:rPr lang="en-US" dirty="0">
+                <a:solidFill>
+                  <a:srgbClr val="0000FF"/>
+                </a:solidFill>
+                <a:uFill>
+                  <a:solidFill>
+                    <a:srgbClr val="0000FF"/>
+                  </a:solidFill>
+                </a:uFill>
+                <a:hlinkClick r:id="rId2"/>
+              </a:rPr>
+              <a:t>https://github.com/COGS108/Lectures-Ellis/tree/wi24/XX_section</a:t>
+            </a:r>
+            <a:endParaRPr dirty="0">
+              <a:solidFill>
+                <a:srgbClr val="0000FF"/>
+              </a:solidFill>
+              <a:uFill>
+                <a:solidFill>
+                  <a:srgbClr val="0000FF"/>
+                </a:solidFill>
+              </a:uFill>
+              <a:hlinkClick r:id="rId2"/>
+            </a:endParaRPr>
+          </a:p>
+          <a:p>
+            <a:pPr defTabSz="553084">
+              <a:defRPr sz="7500"/>
+            </a:pPr>
+            <a:r>
+              <a:rPr dirty="0"/>
+              <a:t>[We will also recap Pandas here]</a:t>
+            </a:r>
+          </a:p>
+        </p:txBody>
+      </p:sp>
+      <p:sp>
+        <p:nvSpPr>
+          <p:cNvPr id="135" name="(The demo is based off of https://www.textbook.ds100.org/ch/01/lifecycle_intro.html)"/>
+          <p:cNvSpPr txBox="1"/>
+          <p:nvPr/>
+        </p:nvSpPr>
+        <p:spPr>
+          <a:xfrm>
+            <a:off x="5718047" y="12584986"/>
+            <a:ext cx="12947905" cy="520701"/>
+          </a:xfrm>
+          <a:prstGeom prst="rect">
+            <a:avLst/>
+          </a:prstGeom>
+          <a:ln w="12700">
+            <a:miter lim="400000"/>
+          </a:ln>
+          <a:extLst>
+            <a:ext uri="{C572A759-6A51-4108-AA02-DFA0A04FC94B}">
+              <ma14:wrappingTextBoxFlag xmlns:ma14="http://schemas.microsoft.com/office/mac/drawingml/2011/main" xmlns:a14="http://schemas.microsoft.com/office/drawing/2010/main" xmlns:m="http://schemas.openxmlformats.org/officeDocument/2006/math" xmlns="" val="1"/>
+            </a:ext>
+          </a:extLst>
+        </p:spPr>
+        <p:txBody>
+          <a:bodyPr wrap="none" lIns="50800" tIns="50800" rIns="50800" bIns="50800" anchor="ctr">
+            <a:spAutoFit/>
+          </a:bodyPr>
+          <a:lstStyle/>
+          <a:p>
+            <a:pPr algn="ctr">
+              <a:spcBef>
+                <a:spcPts val="0"/>
+              </a:spcBef>
+              <a:defRPr sz="2400"/>
+            </a:pPr>
+            <a:r>
+              <a:t>(The demo is based off of </a:t>
+            </a:r>
+            <a:r>
+              <a:rPr u="sng">
+                <a:solidFill>
+                  <a:srgbClr val="0000FF"/>
+                </a:solidFill>
+                <a:uFill>
+                  <a:solidFill>
+                    <a:srgbClr val="0000FF"/>
+                  </a:solidFill>
+                </a:uFill>
+                <a:hlinkClick r:id="rId3"/>
+              </a:rPr>
+              <a:t>https://www.textbook.ds100.org/ch/01/lifecycle_intro.html</a:t>
+            </a:r>
+            <a:r>
+              <a:t>)</a:t>
+            </a:r>
+          </a:p>
+        </p:txBody>
+      </p:sp>
+    </p:spTree>
+  </p:cSld>
+  <p:clrMapOvr>
+    <a:masterClrMapping/>
+  </p:clrMapOvr>
+  <p:transition spd="med"/>
+</p:sld>
+</file>
+
+<file path=ppt/slides/slide5.xml><?xml version="1.0" encoding="utf-8"?>
+<p:sld xmlns:a="http://schemas.openxmlformats.org/drawingml/2006/main" xmlns:r="http://schemas.openxmlformats.org/officeDocument/2006/relationships" xmlns:p="http://schemas.openxmlformats.org/presentationml/2006/main">
+  <p:cSld>
+    <p:spTree>
+      <p:nvGrpSpPr>
+        <p:cNvPr id="1" name=""/>
+        <p:cNvGrpSpPr/>
+        <p:nvPr/>
+      </p:nvGrpSpPr>
+      <p:grpSpPr>
+        <a:xfrm>
+          <a:off x="0" y="0"/>
+          <a:ext cx="0" cy="0"/>
+          <a:chOff x="0" y="0"/>
+          <a:chExt cx="0" cy="0"/>
+        </a:xfrm>
+      </p:grpSpPr>
+      <p:sp>
+        <p:nvSpPr>
+          <p:cNvPr id="137" name="Example research questions from Data is Plural newsletter:"/>
+          <p:cNvSpPr txBox="1">
+            <a:spLocks noGrp="1"/>
+          </p:cNvSpPr>
+          <p:nvPr>
+            <p:ph type="title"/>
+          </p:nvPr>
+        </p:nvSpPr>
+        <p:spPr>
+          <a:prstGeom prst="rect">
+            <a:avLst/>
+          </a:prstGeom>
+        </p:spPr>
+        <p:txBody>
+          <a:bodyPr/>
+          <a:lstStyle>
+            <a:lvl1pPr defTabSz="462280">
+              <a:defRPr sz="6200"/>
+            </a:lvl1pPr>
+          </a:lstStyle>
+          <a:p>
+            <a:r>
+              <a:t>Example research questions from Data is Plural newsletter:</a:t>
+            </a:r>
+          </a:p>
+        </p:txBody>
+      </p:sp>
+      <p:sp>
+        <p:nvSpPr>
+          <p:cNvPr id="138" name="Does China primarily loan to countries with low GDP? Or countries that are military / economic allies?…"/>
+          <p:cNvSpPr txBox="1">
+            <a:spLocks noGrp="1"/>
+          </p:cNvSpPr>
+          <p:nvPr>
+            <p:ph type="body" idx="1"/>
+          </p:nvPr>
+        </p:nvSpPr>
+        <p:spPr>
+          <a:prstGeom prst="rect">
+            <a:avLst/>
+          </a:prstGeom>
+        </p:spPr>
+        <p:txBody>
+          <a:bodyPr/>
+          <a:lstStyle/>
+          <a:p>
+            <a:pPr marL="678656" indent="-678656" defTabSz="784225">
+              <a:spcBef>
+                <a:spcPts val="3800"/>
+              </a:spcBef>
+              <a:defRPr sz="5100"/>
+            </a:pPr>
+            <a:r>
+              <a:t>Does China primarily loan to countries with low GDP? Or countries that are military / economic allies?</a:t>
+            </a:r>
+          </a:p>
+          <a:p>
+            <a:pPr marL="678656" indent="-678656" defTabSz="784225">
+              <a:spcBef>
+                <a:spcPts val="3800"/>
+              </a:spcBef>
+              <a:defRPr sz="5100"/>
+            </a:pPr>
+            <a:r>
+              <a:t>Are there more radio stations per capita for mountainous areas?</a:t>
+            </a:r>
+          </a:p>
+          <a:p>
+            <a:pPr marL="678656" indent="-678656" defTabSz="784225">
+              <a:spcBef>
+                <a:spcPts val="3800"/>
+              </a:spcBef>
+              <a:defRPr sz="5100"/>
+            </a:pPr>
+            <a:r>
+              <a:t>Do cities with more disconnected streets have worse health conditions?</a:t>
+            </a:r>
+          </a:p>
+          <a:p>
+            <a:pPr marL="678656" indent="-678656" defTabSz="784225">
+              <a:spcBef>
+                <a:spcPts val="3800"/>
+              </a:spcBef>
+              <a:defRPr sz="5100"/>
+            </a:pPr>
+            <a:r>
+              <a:t>Are cannabis testing labs consistent with each other?</a:t>
+            </a:r>
+          </a:p>
+          <a:p>
+            <a:pPr marL="678656" indent="-678656" defTabSz="784225">
+              <a:spcBef>
+                <a:spcPts val="3800"/>
+              </a:spcBef>
+              <a:defRPr sz="5100"/>
+            </a:pPr>
+            <a:r>
+              <a:t>Does the number of backyard ice skating rinks change with global temperature patterns?</a:t>
+            </a:r>
+          </a:p>
+        </p:txBody>
+      </p:sp>
+    </p:spTree>
+  </p:cSld>
+  <p:clrMapOvr>
+    <a:masterClrMapping/>
+  </p:clrMapOvr>
+  <p:transition spd="med"/>
+  <p:timing>
+    <p:tnLst>
+      <p:par>
+        <p:cTn id="1" dur="indefinite" restart="never" fill="hold" nodeType="tmRoot">
+          <p:childTnLst>
+            <p:seq concurrent="1" prevAc="none" nextAc="seek">
+              <p:cTn id="2" dur="indefinite" fill="hold" nodeType="mainSeq">
+                <p:childTnLst>
+                  <p:par>
+                    <p:cTn id="3" fill="hold">
+                      <p:stCondLst>
+                        <p:cond delay="indefinite"/>
+                      </p:stCondLst>
+                      <p:childTnLst>
+                        <p:par>
+                          <p:cTn id="4" fill="hold">
+                            <p:stCondLst>
+                              <p:cond delay="0"/>
+                            </p:stCondLst>
+                            <p:childTnLst>
+                              <p:par>
+                                <p:cTn id="5" presetID="1" presetClass="entr" presetSubtype="0" fill="hold" grpId="1" nodeType="clickEffect">
+                                  <p:stCondLst>
+                                    <p:cond delay="0"/>
+                                  </p:stCondLst>
+                                  <p:iterate>
+                                    <p:tmAbs val="0"/>
+                                  </p:iterate>
+                                  <p:childTnLst>
+                                    <p:set>
+                                      <p:cBhvr>
+                                        <p:cTn id="6" fill="hold"/>
+                                        <p:tgtEl>
+                                          <p:spTgt spid="138">
+                                            <p:bg/>
+                                          </p:spTgt>
+                                        </p:tgtEl>
+                                        <p:attrNameLst>
+                                          <p:attrName>style.visibility</p:attrName>
+                                        </p:attrNameLst>
+                                      </p:cBhvr>
+                                      <p:to>
+                                        <p:strVal val="visible"/>
+                                      </p:to>
+                                    </p:set>
+                                  </p:childTnLst>
+                                </p:cTn>
+                              </p:par>
+                              <p:par>
+                                <p:cTn id="7" presetID="1" presetClass="entr" presetSubtype="0" fill="hold" grpId="1" nodeType="withEffect">
+                                  <p:stCondLst>
+                                    <p:cond delay="0"/>
+                                  </p:stCondLst>
+                                  <p:iterate>
+                                    <p:tmAbs val="0"/>
+                                  </p:iterate>
+                                  <p:childTnLst>
+                                    <p:set>
+                                      <p:cBhvr>
+                                        <p:cTn id="8" fill="hold"/>
+                                        <p:tgtEl>
+                                          <p:spTgt spid="138">
+                                            <p:txEl>
+                                              <p:pRg st="0" end="0"/>
+                                            </p:txEl>
+                                          </p:spTgt>
+                                        </p:tgtEl>
+                                        <p:attrNameLst>
+                                          <p:attrName>style.visibility</p:attrName>
+                                        </p:attrNameLst>
+                                      </p:cBhvr>
+                                      <p:to>
+                                        <p:strVal val="visible"/>
+                                      </p:to>
+                                    </p:set>
+                                  </p:childTnLst>
+                                </p:cTn>
+                              </p:par>
+                            </p:childTnLst>
+                          </p:cTn>
+                        </p:par>
+                        <p:par>
+                          <p:cTn id="9" fill="hold">
+                            <p:stCondLst>
+                              <p:cond delay="0"/>
+                            </p:stCondLst>
+                            <p:childTnLst>
+                              <p:par>
+                                <p:cTn id="10" presetID="1" presetClass="entr" presetSubtype="0" fill="hold" grpId="1" nodeType="afterEffect">
+                                  <p:stCondLst>
+                                    <p:cond delay="0"/>
+                                  </p:stCondLst>
+                                  <p:iterate>
+                                    <p:tmAbs val="0"/>
+                                  </p:iterate>
+                                  <p:childTnLst>
+                                    <p:set>
+                                      <p:cBhvr>
+                                        <p:cTn id="11" fill="hold"/>
+                                        <p:tgtEl>
+                                          <p:spTgt spid="138">
+                                            <p:txEl>
+                                              <p:pRg st="1" end="1"/>
+                                            </p:txEl>
+                                          </p:spTgt>
+                                        </p:tgtEl>
+                                        <p:attrNameLst>
+                                          <p:attrName>style.visibility</p:attrName>
+                                        </p:attrNameLst>
+                                      </p:cBhvr>
+                                      <p:to>
+                                        <p:strVal val="visible"/>
+                                      </p:to>
+                                    </p:set>
+                                  </p:childTnLst>
+                                </p:cTn>
+                              </p:par>
+                            </p:childTnLst>
+                          </p:cTn>
+                        </p:par>
+                      </p:childTnLst>
+                    </p:cTn>
+                  </p:par>
+                  <p:par>
+                    <p:cTn id="12" fill="hold">
+                      <p:stCondLst>
+                        <p:cond delay="indefinite"/>
+                      </p:stCondLst>
+                      <p:childTnLst>
+                        <p:par>
+                          <p:cTn id="13" fill="hold">
+                            <p:stCondLst>
+                              <p:cond delay="0"/>
+                            </p:stCondLst>
+                            <p:childTnLst>
+                              <p:par>
+                                <p:cTn id="14" presetID="1" presetClass="entr" presetSubtype="0" fill="hold" grpId="1" nodeType="clickEffect">
+                                  <p:stCondLst>
+                                    <p:cond delay="0"/>
+                                  </p:stCondLst>
+                                  <p:iterate>
+                                    <p:tmAbs val="0"/>
+                                  </p:iterate>
+                                  <p:childTnLst>
+                                    <p:set>
+                                      <p:cBhvr>
+                                        <p:cTn id="15" fill="hold"/>
+                                        <p:tgtEl>
+                                          <p:spTgt spid="138">
+                                            <p:txEl>
+                                              <p:pRg st="2" end="2"/>
+                                            </p:txEl>
+                                          </p:spTgt>
+                                        </p:tgtEl>
+                                        <p:attrNameLst>
+                                          <p:attrName>style.visibility</p:attrName>
+                                        </p:attrNameLst>
+                                      </p:cBhvr>
+                                      <p:to>
+                                        <p:strVal val="visible"/>
+                                      </p:to>
+                                    </p:set>
+                                  </p:childTnLst>
+                                </p:cTn>
+                              </p:par>
+                            </p:childTnLst>
+                          </p:cTn>
+                        </p:par>
+                      </p:childTnLst>
+                    </p:cTn>
+                  </p:par>
+                  <p:par>
+                    <p:cTn id="16" fill="hold">
+                      <p:stCondLst>
+                        <p:cond delay="indefinite"/>
+                      </p:stCondLst>
+                      <p:childTnLst>
+                        <p:par>
+                          <p:cTn id="17" fill="hold">
+                            <p:stCondLst>
+                              <p:cond delay="0"/>
+                            </p:stCondLst>
+                            <p:childTnLst>
+                              <p:par>
+                                <p:cTn id="18" presetID="1" presetClass="entr" presetSubtype="0" fill="hold" grpId="1" nodeType="clickEffect">
+                                  <p:stCondLst>
+                                    <p:cond delay="0"/>
+                                  </p:stCondLst>
+                                  <p:iterate>
+                                    <p:tmAbs val="0"/>
+                                  </p:iterate>
+                                  <p:childTnLst>
+                                    <p:set>
+                                      <p:cBhvr>
+                                        <p:cTn id="19" fill="hold"/>
+                                        <p:tgtEl>
+                                          <p:spTgt spid="138">
+                                            <p:txEl>
+                                              <p:pRg st="3" end="3"/>
+                                            </p:txEl>
+                                          </p:spTgt>
+                                        </p:tgtEl>
+                                        <p:attrNameLst>
+                                          <p:attrName>style.visibility</p:attrName>
+                                        </p:attrNameLst>
+                                      </p:cBhvr>
+                                      <p:to>
+                                        <p:strVal val="visible"/>
+                                      </p:to>
+                                    </p:set>
+                                  </p:childTnLst>
+                                </p:cTn>
+                              </p:par>
+                            </p:childTnLst>
+                          </p:cTn>
+                        </p:par>
+                      </p:childTnLst>
+                    </p:cTn>
+                  </p:par>
+                  <p:par>
+                    <p:cTn id="20" fill="hold">
+                      <p:stCondLst>
+                        <p:cond delay="indefinite"/>
+                      </p:stCondLst>
+                      <p:childTnLst>
+                        <p:par>
+                          <p:cTn id="21" fill="hold">
+                            <p:stCondLst>
+                              <p:cond delay="0"/>
+                            </p:stCondLst>
+                            <p:childTnLst>
+                              <p:par>
+                                <p:cTn id="22" presetID="1" presetClass="entr" presetSubtype="0" fill="hold" grpId="1" nodeType="clickEffect">
+                                  <p:stCondLst>
+                                    <p:cond delay="0"/>
+                                  </p:stCondLst>
+                                  <p:iterate>
+                                    <p:tmAbs val="0"/>
+                                  </p:iterate>
+                                  <p:childTnLst>
+                                    <p:set>
+                                      <p:cBhvr>
+                                        <p:cTn id="23" fill="hold"/>
+                                        <p:tgtEl>
+                                          <p:spTgt spid="138">
+                                            <p:txEl>
+                                              <p:pRg st="4" end="4"/>
+                                            </p:txEl>
+                                          </p:spTgt>
+                                        </p:tgtEl>
+                                        <p:attrNameLst>
+                                          <p:attrName>style.visibility</p:attrName>
+                                        </p:attrNameLst>
+                                      </p:cBhvr>
+                                      <p:to>
+                                        <p:strVal val="visible"/>
+                                      </p:to>
+                                    </p:set>
+                                  </p:childTnLst>
+                                </p:cTn>
+                              </p:par>
+                            </p:childTnLst>
+                          </p:cTn>
+                        </p:par>
+                      </p:childTnLst>
+                    </p:cTn>
+                  </p:par>
+                </p:childTnLst>
+              </p:cTn>
+              <p:prevCondLst>
+                <p:cond evt="onPrev" delay="0">
+                  <p:tgtEl>
+                    <p:sldTgt/>
+                  </p:tgtEl>
+                </p:cond>
+              </p:prevCondLst>
+              <p:nextCondLst>
+                <p:cond evt="onNext" delay="0">
+                  <p:tgtEl>
+                    <p:sldTgt/>
+                  </p:tgtEl>
+                </p:cond>
+              </p:nextCondLst>
+            </p:seq>
+          </p:childTnLst>
+        </p:cTn>
+      </p:par>
+    </p:tnLst>
+    <p:bldLst>
+      <p:bldP spid="138" grpId="1" build="p" bldLvl="5" animBg="1" advAuto="0"/>
+    </p:bldLst>
+  </p:timing>
+</p:sld>
+</file>
+
+<file path=ppt/slides/slide6.xml><?xml version="1.0" encoding="utf-8"?>
+<p:sld xmlns:a="http://schemas.openxmlformats.org/drawingml/2006/main" xmlns:r="http://schemas.openxmlformats.org/officeDocument/2006/relationships" xmlns:p="http://schemas.openxmlformats.org/presentationml/2006/main">
+  <p:cSld>
+    <p:spTree>
+      <p:nvGrpSpPr>
+        <p:cNvPr id="1" name=""/>
+        <p:cNvGrpSpPr/>
+        <p:nvPr/>
+      </p:nvGrpSpPr>
+      <p:grpSpPr>
+        <a:xfrm>
+          <a:off x="0" y="0"/>
+          <a:ext cx="0" cy="0"/>
+          <a:chOff x="0" y="0"/>
+          <a:chExt cx="0" cy="0"/>
+        </a:xfrm>
+      </p:grpSpPr>
+      <p:sp>
+        <p:nvSpPr>
+          <p:cNvPr id="140" name="Rest of time: Work on project proposals/ A2.…"/>
+          <p:cNvSpPr txBox="1">
+            <a:spLocks noGrp="1"/>
+          </p:cNvSpPr>
+          <p:nvPr>
+            <p:ph type="title"/>
+          </p:nvPr>
+        </p:nvSpPr>
+        <p:spPr>
+          <a:xfrm>
+            <a:off x="1778000" y="1354227"/>
+            <a:ext cx="20828000" cy="11007546"/>
+          </a:xfrm>
+          <a:prstGeom prst="rect">
+            <a:avLst/>
+          </a:prstGeom>
+        </p:spPr>
+        <p:txBody>
+          <a:bodyPr/>
+          <a:lstStyle/>
+          <a:p>
+            <a:pPr defTabSz="792479">
+              <a:defRPr sz="10700"/>
+            </a:pPr>
+            <a:r>
+              <a:rPr dirty="0"/>
+              <a:t>Rest of time:</a:t>
+            </a:r>
+            <a:br>
+              <a:rPr dirty="0"/>
+            </a:br>
+            <a:r>
+              <a:rPr dirty="0"/>
+              <a:t>Work on project proposals/ A2.</a:t>
+            </a:r>
+          </a:p>
+          <a:p>
+            <a:pPr defTabSz="792479">
+              <a:defRPr sz="10700"/>
+            </a:pPr>
+            <a:endParaRPr dirty="0"/>
+          </a:p>
+        </p:txBody>
+      </p:sp>
+    </p:spTree>
+  </p:cSld>
+  <p:clrMapOvr>
+    <a:masterClrMapping/>
+  </p:clrMapOvr>
+  <p:transition spd="med"/>
 </p:sld>
 </file>
 
@@ -5783,10 +4790,10 @@
         <a:srgbClr val="FFFFFF"/>
       </a:lt1>
       <a:dk2>
-        <a:srgbClr val="5E5E5E"/>
+        <a:srgbClr val="A7A7A7"/>
       </a:dk2>
       <a:lt2>
-        <a:srgbClr val="D5D5D5"/>
+        <a:srgbClr val="535353"/>
       </a:lt2>
       <a:accent1>
         <a:srgbClr val="00A2FF"/>
@@ -5815,14 +4822,14 @@
     </a:clrScheme>
     <a:fontScheme name="White">
       <a:majorFont>
-        <a:latin typeface="Avenir Next"/>
-        <a:ea typeface="Avenir Next"/>
-        <a:cs typeface="Avenir Next"/>
+        <a:latin typeface="Helvetica Neue"/>
+        <a:ea typeface="Helvetica Neue"/>
+        <a:cs typeface="Helvetica Neue"/>
       </a:majorFont>
       <a:minorFont>
-        <a:latin typeface="Avenir Next"/>
-        <a:ea typeface="Avenir Next"/>
-        <a:cs typeface="Avenir Next"/>
+        <a:latin typeface="Helvetica"/>
+        <a:ea typeface="Helvetica"/>
+        <a:cs typeface="Helvetica"/>
       </a:minorFont>
     </a:fontScheme>
     <a:fmtScheme name="White">
@@ -5963,11 +4970,14 @@
     <a:spDef>
       <a:spPr>
         <a:solidFill>
-          <a:schemeClr val="accent1"/>
+          <a:srgbClr val="FFFFFF"/>
         </a:solidFill>
-        <a:ln w="12700" cap="flat">
-          <a:noFill/>
-          <a:miter lim="400000"/>
+        <a:ln w="25400" cap="flat">
+          <a:solidFill>
+            <a:schemeClr val="accent1"/>
+          </a:solidFill>
+          <a:prstDash val="solid"/>
+          <a:round/>
         </a:ln>
         <a:effectLst/>
         <a:sp3d/>
@@ -5976,12 +4986,12 @@
         <a:spAutoFit/>
       </a:bodyPr>
       <a:lstStyle>
-        <a:defPPr marL="0" marR="0" indent="0" algn="ctr" defTabSz="825500" rtl="0" fontAlgn="auto" latinLnBrk="0" hangingPunct="0">
+        <a:defPPr marL="0" marR="0" indent="0" algn="l" defTabSz="825500" rtl="0" fontAlgn="auto" latinLnBrk="0" hangingPunct="0">
           <a:lnSpc>
             <a:spcPct val="100000"/>
           </a:lnSpc>
           <a:spcBef>
-            <a:spcPts val="0"/>
+            <a:spcPts val="5400"/>
           </a:spcBef>
           <a:spcAft>
             <a:spcPts val="0"/>
@@ -5991,19 +5001,19 @@
           <a:buFontTx/>
           <a:buNone/>
           <a:tabLst/>
-          <a:defRPr kumimoji="0" sz="3200" b="0" i="0" u="none" strike="noStrike" cap="none" spc="0" normalizeH="0" baseline="0">
+          <a:defRPr kumimoji="0" sz="5400" b="1" i="0" u="none" strike="noStrike" cap="none" spc="0" normalizeH="0" baseline="0">
             <a:ln>
               <a:noFill/>
             </a:ln>
             <a:solidFill>
-              <a:srgbClr val="FFFFFF"/>
+              <a:srgbClr val="000000"/>
             </a:solidFill>
             <a:effectLst/>
             <a:uFillTx/>
-            <a:latin typeface="Helvetica Neue Medium"/>
-            <a:ea typeface="Helvetica Neue Medium"/>
-            <a:cs typeface="Helvetica Neue Medium"/>
-            <a:sym typeface="Helvetica Neue Medium"/>
+            <a:latin typeface="Avenir Next"/>
+            <a:ea typeface="Avenir Next"/>
+            <a:cs typeface="Avenir Next"/>
+            <a:sym typeface="Avenir Next"/>
           </a:defRPr>
         </a:defPPr>
         <a:lvl1pPr marL="0" marR="0" indent="0" algn="l" defTabSz="914400" rtl="0" fontAlgn="auto" latinLnBrk="1" hangingPunct="0">
@@ -6259,10 +5269,10 @@
         <a:noFill/>
         <a:ln w="25400" cap="flat">
           <a:solidFill>
-            <a:srgbClr val="000000"/>
+            <a:schemeClr val="accent1"/>
           </a:solidFill>
           <a:prstDash val="solid"/>
-          <a:miter lim="400000"/>
+          <a:round/>
         </a:ln>
         <a:effectLst/>
         <a:sp3d/>
@@ -6583,9 +5593,9 @@
             </a:solidFill>
             <a:effectLst/>
             <a:uFillTx/>
-            <a:latin typeface="+mn-lt"/>
-            <a:ea typeface="+mn-ea"/>
-            <a:cs typeface="+mn-cs"/>
+            <a:latin typeface="Avenir Next"/>
+            <a:ea typeface="Avenir Next"/>
+            <a:cs typeface="Avenir Next"/>
             <a:sym typeface="Avenir Next"/>
           </a:defRPr>
         </a:defPPr>
@@ -6853,10 +5863,10 @@
         <a:srgbClr val="FFFFFF"/>
       </a:lt1>
       <a:dk2>
-        <a:srgbClr val="5E5E5E"/>
+        <a:srgbClr val="A7A7A7"/>
       </a:dk2>
       <a:lt2>
-        <a:srgbClr val="D5D5D5"/>
+        <a:srgbClr val="535353"/>
       </a:lt2>
       <a:accent1>
         <a:srgbClr val="00A2FF"/>
@@ -6885,14 +5895,14 @@
     </a:clrScheme>
     <a:fontScheme name="White">
       <a:majorFont>
-        <a:latin typeface="Avenir Next"/>
-        <a:ea typeface="Avenir Next"/>
-        <a:cs typeface="Avenir Next"/>
+        <a:latin typeface="Helvetica Neue"/>
+        <a:ea typeface="Helvetica Neue"/>
+        <a:cs typeface="Helvetica Neue"/>
       </a:majorFont>
       <a:minorFont>
-        <a:latin typeface="Avenir Next"/>
-        <a:ea typeface="Avenir Next"/>
-        <a:cs typeface="Avenir Next"/>
+        <a:latin typeface="Helvetica"/>
+        <a:ea typeface="Helvetica"/>
+        <a:cs typeface="Helvetica"/>
       </a:minorFont>
     </a:fontScheme>
     <a:fmtScheme name="White">
@@ -7033,11 +6043,14 @@
     <a:spDef>
       <a:spPr>
         <a:solidFill>
-          <a:schemeClr val="accent1"/>
+          <a:srgbClr val="FFFFFF"/>
         </a:solidFill>
-        <a:ln w="12700" cap="flat">
-          <a:noFill/>
-          <a:miter lim="400000"/>
+        <a:ln w="25400" cap="flat">
+          <a:solidFill>
+            <a:schemeClr val="accent1"/>
+          </a:solidFill>
+          <a:prstDash val="solid"/>
+          <a:round/>
         </a:ln>
         <a:effectLst/>
         <a:sp3d/>
@@ -7046,12 +6059,12 @@
         <a:spAutoFit/>
       </a:bodyPr>
       <a:lstStyle>
-        <a:defPPr marL="0" marR="0" indent="0" algn="ctr" defTabSz="825500" rtl="0" fontAlgn="auto" latinLnBrk="0" hangingPunct="0">
+        <a:defPPr marL="0" marR="0" indent="0" algn="l" defTabSz="825500" rtl="0" fontAlgn="auto" latinLnBrk="0" hangingPunct="0">
           <a:lnSpc>
             <a:spcPct val="100000"/>
           </a:lnSpc>
           <a:spcBef>
-            <a:spcPts val="0"/>
+            <a:spcPts val="5400"/>
           </a:spcBef>
           <a:spcAft>
             <a:spcPts val="0"/>
@@ -7061,19 +6074,19 @@
           <a:buFontTx/>
           <a:buNone/>
           <a:tabLst/>
-          <a:defRPr kumimoji="0" sz="3200" b="0" i="0" u="none" strike="noStrike" cap="none" spc="0" normalizeH="0" baseline="0">
+          <a:defRPr kumimoji="0" sz="5400" b="1" i="0" u="none" strike="noStrike" cap="none" spc="0" normalizeH="0" baseline="0">
             <a:ln>
               <a:noFill/>
             </a:ln>
             <a:solidFill>
-              <a:srgbClr val="FFFFFF"/>
+              <a:srgbClr val="000000"/>
             </a:solidFill>
             <a:effectLst/>
             <a:uFillTx/>
-            <a:latin typeface="Helvetica Neue Medium"/>
-            <a:ea typeface="Helvetica Neue Medium"/>
-            <a:cs typeface="Helvetica Neue Medium"/>
-            <a:sym typeface="Helvetica Neue Medium"/>
+            <a:latin typeface="Avenir Next"/>
+            <a:ea typeface="Avenir Next"/>
+            <a:cs typeface="Avenir Next"/>
+            <a:sym typeface="Avenir Next"/>
           </a:defRPr>
         </a:defPPr>
         <a:lvl1pPr marL="0" marR="0" indent="0" algn="l" defTabSz="914400" rtl="0" fontAlgn="auto" latinLnBrk="1" hangingPunct="0">
@@ -7329,10 +6342,10 @@
         <a:noFill/>
         <a:ln w="25400" cap="flat">
           <a:solidFill>
-            <a:srgbClr val="000000"/>
+            <a:schemeClr val="accent1"/>
           </a:solidFill>
           <a:prstDash val="solid"/>
-          <a:miter lim="400000"/>
+          <a:round/>
         </a:ln>
         <a:effectLst/>
         <a:sp3d/>
@@ -7653,9 +6666,9 @@
             </a:solidFill>
             <a:effectLst/>
             <a:uFillTx/>
-            <a:latin typeface="+mn-lt"/>
-            <a:ea typeface="+mn-ea"/>
-            <a:cs typeface="+mn-cs"/>
+            <a:latin typeface="Avenir Next"/>
+            <a:ea typeface="Avenir Next"/>
+            <a:cs typeface="Avenir Next"/>
             <a:sym typeface="Avenir Next"/>
           </a:defRPr>
         </a:defPPr>

</xml_diff>